<commit_message>
Stand Dienstag frueher Abend
</commit_message>
<xml_diff>
--- a/Flux Introduction.pptx
+++ b/Flux Introduction.pptx
@@ -136,7 +136,7 @@
   </p:defaultTextStyle>
   <p:extLst>
     <p:ext uri="{EFAFB233-063F-42B5-8137-9DF3F51BA10A}">
-      <p15:sldGuideLst xmlns:p15="http://schemas.microsoft.com/office/powerpoint/2012/main">
+      <p15:sldGuideLst xmlns:p15="http://schemas.microsoft.com/office/powerpoint/2012/main" xmlns="">
         <p15:guide id="1" orient="horz" pos="3300">
           <p15:clr>
             <a:srgbClr val="A4A3A4"/>
@@ -236,7 +236,7 @@
             <a:fld id="{BB937446-253D-9247-BD46-8A12B019035C}" type="datetimeFigureOut">
               <a:rPr lang="de-DE" smtClean="0"/>
               <a:pPr/>
-              <a:t>18.08.2015</a:t>
+              <a:t>18.08.15</a:t>
             </a:fld>
             <a:endParaRPr lang="de-DE"/>
           </a:p>
@@ -403,7 +403,7 @@
             <a:fld id="{D03C3069-EAFB-4145-8E4B-04F54E649D99}" type="datetimeFigureOut">
               <a:rPr lang="de-DE" smtClean="0"/>
               <a:pPr/>
-              <a:t>18.08.2015</a:t>
+              <a:t>18.08.15</a:t>
             </a:fld>
             <a:endParaRPr lang="de-DE"/>
           </a:p>
@@ -3132,7 +3132,7 @@
   <p:timing>
     <p:tnLst>
       <p:par>
-        <p:cTn id="1" dur="indefinite" restart="never" nodeType="tmRoot"/>
+        <p:cTn xmlns:p14="http://schemas.microsoft.com/office/powerpoint/2010/main" id="1" dur="indefinite" restart="never" nodeType="tmRoot"/>
       </p:par>
     </p:tnLst>
   </p:timing>
@@ -3243,15 +3243,7 @@
                   <a:srgbClr val="4E4D4D"/>
                 </a:solidFill>
               </a:rPr>
-              <a:t> </a:t>
-            </a:r>
-            <a:r>
-              <a:rPr lang="de-DE" sz="3000" b="1" dirty="0" smtClean="0">
-                <a:solidFill>
-                  <a:srgbClr val="4E4D4D"/>
-                </a:solidFill>
-              </a:rPr>
-              <a:t>Central Dispatcher</a:t>
+              <a:t> Central Dispatcher</a:t>
             </a:r>
           </a:p>
           <a:p>
@@ -3281,76 +3273,9 @@
           <a:p>
             <a:r>
               <a:rPr lang="de-DE" dirty="0" smtClean="0"/>
-              <a:t>UNI-DIRECTIONAL DATA </a:t>
-            </a:r>
-            <a:r>
-              <a:rPr lang="de-DE" dirty="0" smtClean="0"/>
-              <a:t>FLOW - 2</a:t>
+              <a:t>UNI-DIRECTIONAL DATA FLOW - 2</a:t>
             </a:r>
             <a:endParaRPr lang="de-DE" dirty="0"/>
-          </a:p>
-        </p:txBody>
-      </p:sp>
-      <p:pic>
-        <p:nvPicPr>
-          <p:cNvPr id="9" name="Bild 8"/>
-          <p:cNvPicPr>
-            <a:picLocks noChangeAspect="1"/>
-          </p:cNvPicPr>
-          <p:nvPr/>
-        </p:nvPicPr>
-        <p:blipFill>
-          <a:blip r:embed="rId2"/>
-          <a:stretch>
-            <a:fillRect/>
-          </a:stretch>
-        </p:blipFill>
-        <p:spPr>
-          <a:xfrm>
-            <a:off x="993757" y="1052736"/>
-            <a:ext cx="7156487" cy="2448272"/>
-          </a:xfrm>
-          <a:prstGeom prst="rect">
-            <a:avLst/>
-          </a:prstGeom>
-        </p:spPr>
-      </p:pic>
-      <p:sp>
-        <p:nvSpPr>
-          <p:cNvPr id="4" name="Ellipse 3"/>
-          <p:cNvSpPr/>
-          <p:nvPr/>
-        </p:nvSpPr>
-        <p:spPr>
-          <a:xfrm>
-            <a:off x="467544" y="908720"/>
-            <a:ext cx="8280920" cy="1944216"/>
-          </a:xfrm>
-          <a:prstGeom prst="ellipse">
-            <a:avLst/>
-          </a:prstGeom>
-          <a:noFill/>
-        </p:spPr>
-        <p:style>
-          <a:lnRef idx="1">
-            <a:schemeClr val="accent1"/>
-          </a:lnRef>
-          <a:fillRef idx="3">
-            <a:schemeClr val="accent1"/>
-          </a:fillRef>
-          <a:effectRef idx="2">
-            <a:schemeClr val="accent1"/>
-          </a:effectRef>
-          <a:fontRef idx="minor">
-            <a:schemeClr val="lt1"/>
-          </a:fontRef>
-        </p:style>
-        <p:txBody>
-          <a:bodyPr rtlCol="0" anchor="ctr"/>
-          <a:lstStyle/>
-          <a:p>
-            <a:pPr algn="ctr"/>
-            <a:endParaRPr lang="de-DE"/>
           </a:p>
         </p:txBody>
       </p:sp>
@@ -3656,6 +3581,30 @@
           </a:p>
         </p:txBody>
       </p:sp>
+      <p:pic>
+        <p:nvPicPr>
+          <p:cNvPr id="11" name="Bild 10"/>
+          <p:cNvPicPr>
+            <a:picLocks noChangeAspect="1"/>
+          </p:cNvPicPr>
+          <p:nvPr/>
+        </p:nvPicPr>
+        <p:blipFill>
+          <a:blip r:embed="rId2"/>
+          <a:stretch>
+            <a:fillRect/>
+          </a:stretch>
+        </p:blipFill>
+        <p:spPr>
+          <a:xfrm>
+            <a:off x="409556" y="1059951"/>
+            <a:ext cx="7834852" cy="1646086"/>
+          </a:xfrm>
+          <a:prstGeom prst="rect">
+            <a:avLst/>
+          </a:prstGeom>
+        </p:spPr>
+      </p:pic>
     </p:spTree>
     <p:extLst>
       <p:ext uri="{BB962C8B-B14F-4D97-AF65-F5344CB8AC3E}">
@@ -3669,7 +3618,7 @@
   <p:timing>
     <p:tnLst>
       <p:par>
-        <p:cTn id="1" dur="indefinite" restart="never" nodeType="tmRoot"/>
+        <p:cTn xmlns:p14="http://schemas.microsoft.com/office/powerpoint/2010/main" id="1" dur="indefinite" restart="never" nodeType="tmRoot"/>
       </p:par>
     </p:tnLst>
   </p:timing>
@@ -3810,11 +3759,7 @@
           <a:p>
             <a:r>
               <a:rPr lang="de-DE" dirty="0" smtClean="0"/>
-              <a:t>UNI-DIRECTIONAL DATA </a:t>
-            </a:r>
-            <a:r>
-              <a:rPr lang="de-DE" dirty="0" smtClean="0"/>
-              <a:t>FLOW - 3</a:t>
+              <a:t>UNI-DIRECTIONAL DATA FLOW - 3</a:t>
             </a:r>
             <a:endParaRPr lang="de-DE" dirty="0"/>
           </a:p>
@@ -3822,7 +3767,7 @@
       </p:sp>
       <p:pic>
         <p:nvPicPr>
-          <p:cNvPr id="9" name="Bild 8"/>
+          <p:cNvPr id="7" name="Bild 6"/>
           <p:cNvPicPr>
             <a:picLocks noChangeAspect="1"/>
           </p:cNvPicPr>
@@ -3836,53 +3781,14 @@
         </p:blipFill>
         <p:spPr>
           <a:xfrm>
-            <a:off x="993757" y="1052736"/>
-            <a:ext cx="7156487" cy="2448272"/>
+            <a:off x="409575" y="1063625"/>
+            <a:ext cx="7837206" cy="2633627"/>
           </a:xfrm>
           <a:prstGeom prst="rect">
             <a:avLst/>
           </a:prstGeom>
         </p:spPr>
       </p:pic>
-      <p:sp>
-        <p:nvSpPr>
-          <p:cNvPr id="4" name="Ellipse 3"/>
-          <p:cNvSpPr/>
-          <p:nvPr/>
-        </p:nvSpPr>
-        <p:spPr>
-          <a:xfrm>
-            <a:off x="467544" y="908720"/>
-            <a:ext cx="8280920" cy="1944216"/>
-          </a:xfrm>
-          <a:prstGeom prst="ellipse">
-            <a:avLst/>
-          </a:prstGeom>
-          <a:noFill/>
-        </p:spPr>
-        <p:style>
-          <a:lnRef idx="1">
-            <a:schemeClr val="accent1"/>
-          </a:lnRef>
-          <a:fillRef idx="3">
-            <a:schemeClr val="accent1"/>
-          </a:fillRef>
-          <a:effectRef idx="2">
-            <a:schemeClr val="accent1"/>
-          </a:effectRef>
-          <a:fontRef idx="minor">
-            <a:schemeClr val="lt1"/>
-          </a:fontRef>
-        </p:style>
-        <p:txBody>
-          <a:bodyPr rtlCol="0" anchor="ctr"/>
-          <a:lstStyle/>
-          <a:p>
-            <a:pPr algn="ctr"/>
-            <a:endParaRPr lang="de-DE"/>
-          </a:p>
-        </p:txBody>
-      </p:sp>
     </p:spTree>
     <p:extLst>
       <p:ext uri="{BB962C8B-B14F-4D97-AF65-F5344CB8AC3E}">
@@ -3896,7 +3802,7 @@
   <p:timing>
     <p:tnLst>
       <p:par>
-        <p:cTn id="1" dur="indefinite" restart="never" nodeType="tmRoot"/>
+        <p:cTn xmlns:p14="http://schemas.microsoft.com/office/powerpoint/2010/main" id="1" dur="indefinite" restart="never" nodeType="tmRoot"/>
       </p:par>
     </p:tnLst>
   </p:timing>
@@ -4074,76 +3980,9 @@
           <a:p>
             <a:r>
               <a:rPr lang="de-DE" dirty="0" smtClean="0"/>
-              <a:t>UNI-DIRECTIONAL DATA </a:t>
-            </a:r>
-            <a:r>
-              <a:rPr lang="de-DE" dirty="0" smtClean="0"/>
-              <a:t>FLOW - 4</a:t>
+              <a:t>UNI-DIRECTIONAL DATA FLOW - 4</a:t>
             </a:r>
             <a:endParaRPr lang="de-DE" dirty="0"/>
-          </a:p>
-        </p:txBody>
-      </p:sp>
-      <p:pic>
-        <p:nvPicPr>
-          <p:cNvPr id="9" name="Bild 8"/>
-          <p:cNvPicPr>
-            <a:picLocks noChangeAspect="1"/>
-          </p:cNvPicPr>
-          <p:nvPr/>
-        </p:nvPicPr>
-        <p:blipFill>
-          <a:blip r:embed="rId2"/>
-          <a:stretch>
-            <a:fillRect/>
-          </a:stretch>
-        </p:blipFill>
-        <p:spPr>
-          <a:xfrm>
-            <a:off x="993757" y="1052736"/>
-            <a:ext cx="7156487" cy="2448272"/>
-          </a:xfrm>
-          <a:prstGeom prst="rect">
-            <a:avLst/>
-          </a:prstGeom>
-        </p:spPr>
-      </p:pic>
-      <p:sp>
-        <p:nvSpPr>
-          <p:cNvPr id="4" name="Ellipse 3"/>
-          <p:cNvSpPr/>
-          <p:nvPr/>
-        </p:nvSpPr>
-        <p:spPr>
-          <a:xfrm>
-            <a:off x="467544" y="908720"/>
-            <a:ext cx="8280920" cy="1944216"/>
-          </a:xfrm>
-          <a:prstGeom prst="ellipse">
-            <a:avLst/>
-          </a:prstGeom>
-          <a:noFill/>
-        </p:spPr>
-        <p:style>
-          <a:lnRef idx="1">
-            <a:schemeClr val="accent1"/>
-          </a:lnRef>
-          <a:fillRef idx="3">
-            <a:schemeClr val="accent1"/>
-          </a:fillRef>
-          <a:effectRef idx="2">
-            <a:schemeClr val="accent1"/>
-          </a:effectRef>
-          <a:fontRef idx="minor">
-            <a:schemeClr val="lt1"/>
-          </a:fontRef>
-        </p:style>
-        <p:txBody>
-          <a:bodyPr rtlCol="0" anchor="ctr"/>
-          <a:lstStyle/>
-          <a:p>
-            <a:pPr algn="ctr"/>
-            <a:endParaRPr lang="de-DE"/>
           </a:p>
         </p:txBody>
       </p:sp>
@@ -4487,6 +4326,30 @@
           </a:p>
         </p:txBody>
       </p:sp>
+      <p:pic>
+        <p:nvPicPr>
+          <p:cNvPr id="8" name="Bild 7"/>
+          <p:cNvPicPr>
+            <a:picLocks noChangeAspect="1"/>
+          </p:cNvPicPr>
+          <p:nvPr/>
+        </p:nvPicPr>
+        <p:blipFill>
+          <a:blip r:embed="rId2"/>
+          <a:stretch>
+            <a:fillRect/>
+          </a:stretch>
+        </p:blipFill>
+        <p:spPr>
+          <a:xfrm>
+            <a:off x="419101" y="1079500"/>
+            <a:ext cx="7810500" cy="2616200"/>
+          </a:xfrm>
+          <a:prstGeom prst="rect">
+            <a:avLst/>
+          </a:prstGeom>
+        </p:spPr>
+      </p:pic>
     </p:spTree>
     <p:extLst>
       <p:ext uri="{BB962C8B-B14F-4D97-AF65-F5344CB8AC3E}">
@@ -4500,7 +4363,7 @@
   <p:timing>
     <p:tnLst>
       <p:par>
-        <p:cTn id="1" dur="indefinite" restart="never" nodeType="tmRoot"/>
+        <p:cTn xmlns:p14="http://schemas.microsoft.com/office/powerpoint/2010/main" id="1" dur="indefinite" restart="never" nodeType="tmRoot"/>
       </p:par>
     </p:tnLst>
   </p:timing>
@@ -4680,76 +4543,9 @@
           <a:p>
             <a:r>
               <a:rPr lang="de-DE" dirty="0" smtClean="0"/>
-              <a:t>UNI-DIRECTIONAL DATA </a:t>
-            </a:r>
-            <a:r>
-              <a:rPr lang="de-DE" dirty="0" smtClean="0"/>
-              <a:t>FLOW - 5</a:t>
+              <a:t>UNI-DIRECTIONAL DATA FLOW - 5</a:t>
             </a:r>
             <a:endParaRPr lang="de-DE" dirty="0"/>
-          </a:p>
-        </p:txBody>
-      </p:sp>
-      <p:pic>
-        <p:nvPicPr>
-          <p:cNvPr id="9" name="Bild 8"/>
-          <p:cNvPicPr>
-            <a:picLocks noChangeAspect="1"/>
-          </p:cNvPicPr>
-          <p:nvPr/>
-        </p:nvPicPr>
-        <p:blipFill>
-          <a:blip r:embed="rId2"/>
-          <a:stretch>
-            <a:fillRect/>
-          </a:stretch>
-        </p:blipFill>
-        <p:spPr>
-          <a:xfrm>
-            <a:off x="993757" y="1052736"/>
-            <a:ext cx="7156487" cy="2448272"/>
-          </a:xfrm>
-          <a:prstGeom prst="rect">
-            <a:avLst/>
-          </a:prstGeom>
-        </p:spPr>
-      </p:pic>
-      <p:sp>
-        <p:nvSpPr>
-          <p:cNvPr id="4" name="Ellipse 3"/>
-          <p:cNvSpPr/>
-          <p:nvPr/>
-        </p:nvSpPr>
-        <p:spPr>
-          <a:xfrm>
-            <a:off x="467544" y="908720"/>
-            <a:ext cx="8280920" cy="2880320"/>
-          </a:xfrm>
-          <a:prstGeom prst="ellipse">
-            <a:avLst/>
-          </a:prstGeom>
-          <a:noFill/>
-        </p:spPr>
-        <p:style>
-          <a:lnRef idx="1">
-            <a:schemeClr val="accent1"/>
-          </a:lnRef>
-          <a:fillRef idx="3">
-            <a:schemeClr val="accent1"/>
-          </a:fillRef>
-          <a:effectRef idx="2">
-            <a:schemeClr val="accent1"/>
-          </a:effectRef>
-          <a:fontRef idx="minor">
-            <a:schemeClr val="lt1"/>
-          </a:fontRef>
-        </p:style>
-        <p:txBody>
-          <a:bodyPr rtlCol="0" anchor="ctr"/>
-          <a:lstStyle/>
-          <a:p>
-            <a:pPr algn="ctr"/>
-            <a:endParaRPr lang="de-DE"/>
           </a:p>
         </p:txBody>
       </p:sp>
@@ -4948,6 +4744,30 @@
           </a:p>
         </p:txBody>
       </p:sp>
+      <p:pic>
+        <p:nvPicPr>
+          <p:cNvPr id="7" name="Bild 6"/>
+          <p:cNvPicPr>
+            <a:picLocks noChangeAspect="1"/>
+          </p:cNvPicPr>
+          <p:nvPr/>
+        </p:nvPicPr>
+        <p:blipFill>
+          <a:blip r:embed="rId2"/>
+          <a:stretch>
+            <a:fillRect/>
+          </a:stretch>
+        </p:blipFill>
+        <p:spPr>
+          <a:xfrm>
+            <a:off x="419101" y="1079500"/>
+            <a:ext cx="7810500" cy="2616200"/>
+          </a:xfrm>
+          <a:prstGeom prst="rect">
+            <a:avLst/>
+          </a:prstGeom>
+        </p:spPr>
+      </p:pic>
     </p:spTree>
     <p:extLst>
       <p:ext uri="{BB962C8B-B14F-4D97-AF65-F5344CB8AC3E}">
@@ -4961,7 +4781,7 @@
   <p:timing>
     <p:tnLst>
       <p:par>
-        <p:cTn id="1" dur="indefinite" restart="never" nodeType="tmRoot"/>
+        <p:cTn xmlns:p14="http://schemas.microsoft.com/office/powerpoint/2010/main" id="1" dur="indefinite" restart="never" nodeType="tmRoot"/>
       </p:par>
     </p:tnLst>
   </p:timing>
@@ -5067,7 +4887,7 @@
   <p:timing>
     <p:tnLst>
       <p:par>
-        <p:cTn id="1" dur="indefinite" restart="never" nodeType="tmRoot"/>
+        <p:cTn xmlns:p14="http://schemas.microsoft.com/office/powerpoint/2010/main" id="1" dur="indefinite" restart="never" nodeType="tmRoot"/>
       </p:par>
     </p:tnLst>
   </p:timing>
@@ -5470,7 +5290,7 @@
   <p:timing>
     <p:tnLst>
       <p:par>
-        <p:cTn id="1" dur="indefinite" restart="never" nodeType="tmRoot"/>
+        <p:cTn xmlns:p14="http://schemas.microsoft.com/office/powerpoint/2010/main" id="1" dur="indefinite" restart="never" nodeType="tmRoot"/>
       </p:par>
     </p:tnLst>
   </p:timing>
@@ -5518,7 +5338,6 @@
               <a:rPr lang="de-DE" sz="2800" b="1" dirty="0" smtClean="0"/>
               <a:t>Action</a:t>
             </a:r>
-            <a:endParaRPr lang="de-DE" sz="2800" b="1" dirty="0" smtClean="0"/>
           </a:p>
           <a:p>
             <a:r>
@@ -5574,17 +5393,8 @@
             </a:r>
             <a:r>
               <a:rPr lang="de-DE" sz="2800" dirty="0" smtClean="0"/>
-              <a:t> „type</a:t>
-            </a:r>
-            <a:r>
-              <a:rPr lang="de-DE" sz="2800" dirty="0" smtClean="0"/>
-              <a:t>“ </a:t>
-            </a:r>
-            <a:r>
-              <a:rPr lang="de-DE" sz="2800" dirty="0" smtClean="0"/>
-              <a:t>(USER_ADDED)</a:t>
-            </a:r>
-            <a:endParaRPr lang="de-DE" sz="2800" dirty="0" smtClean="0"/>
+              <a:t> „type“ (USER_ADDED)</a:t>
+            </a:r>
           </a:p>
           <a:p>
             <a:r>
@@ -5609,11 +5419,7 @@
             </a:r>
             <a:r>
               <a:rPr lang="de-DE" sz="2800" dirty="0" smtClean="0"/>
-              <a:t> </a:t>
-            </a:r>
-            <a:r>
-              <a:rPr lang="de-DE" sz="2800" dirty="0" smtClean="0"/>
-              <a:t>happend (Name </a:t>
+              <a:t> happend (Name </a:t>
             </a:r>
             <a:r>
               <a:rPr lang="de-DE" sz="2800" dirty="0" err="1" smtClean="0"/>
@@ -5840,16 +5646,11 @@
               <a:rPr lang="de-DE" sz="2800" dirty="0" smtClean="0"/>
               <a:t>)</a:t>
             </a:r>
-            <a:endParaRPr lang="de-DE" sz="2800" dirty="0" smtClean="0"/>
           </a:p>
           <a:p>
             <a:r>
               <a:rPr lang="de-DE" sz="2800" dirty="0" smtClean="0"/>
-              <a:t>Pass </a:t>
-            </a:r>
-            <a:r>
-              <a:rPr lang="de-DE" sz="2800" dirty="0" smtClean="0"/>
-              <a:t>Action </a:t>
+              <a:t>Pass Action </a:t>
             </a:r>
             <a:r>
               <a:rPr lang="de-DE" sz="2800" dirty="0" err="1" smtClean="0"/>
@@ -5919,7 +5720,7 @@
   <p:timing>
     <p:tnLst>
       <p:par>
-        <p:cTn id="1" dur="indefinite" restart="never" nodeType="tmRoot"/>
+        <p:cTn xmlns:p14="http://schemas.microsoft.com/office/powerpoint/2010/main" id="1" dur="indefinite" restart="never" nodeType="tmRoot"/>
       </p:par>
     </p:tnLst>
   </p:timing>
@@ -5959,23 +5760,55 @@
           <a:lstStyle/>
           <a:p>
             <a:r>
+              <a:rPr lang="de-DE" sz="2800" i="1" dirty="0" smtClean="0"/>
+              <a:t>Pure </a:t>
+            </a:r>
+            <a:r>
+              <a:rPr lang="de-DE" sz="2800" i="1" dirty="0" err="1" smtClean="0"/>
+              <a:t>t</a:t>
+            </a:r>
+            <a:r>
+              <a:rPr lang="de-DE" sz="2800" i="1" dirty="0" err="1" smtClean="0"/>
+              <a:t>echnical</a:t>
+            </a:r>
+            <a:r>
               <a:rPr lang="de-DE" sz="2800" dirty="0" smtClean="0"/>
-              <a:t>Technical </a:t>
+              <a:t> </a:t>
             </a:r>
             <a:r>
               <a:rPr lang="de-DE" sz="2800" dirty="0" err="1" smtClean="0"/>
               <a:t>component</a:t>
             </a:r>
+            <a:r>
+              <a:rPr lang="de-DE" sz="2800" dirty="0" smtClean="0"/>
+              <a:t>, </a:t>
+            </a:r>
+            <a:r>
+              <a:rPr lang="de-DE" sz="2800" dirty="0" err="1" smtClean="0"/>
+              <a:t>no</a:t>
+            </a:r>
+            <a:r>
+              <a:rPr lang="de-DE" sz="2800" dirty="0" smtClean="0"/>
+              <a:t> </a:t>
+            </a:r>
+            <a:r>
+              <a:rPr lang="de-DE" sz="2800" dirty="0" err="1" smtClean="0"/>
+              <a:t>business</a:t>
+            </a:r>
+            <a:r>
+              <a:rPr lang="de-DE" sz="2800" dirty="0" smtClean="0"/>
+              <a:t> </a:t>
+            </a:r>
+            <a:r>
+              <a:rPr lang="de-DE" sz="2800" dirty="0" err="1" smtClean="0"/>
+              <a:t>logic</a:t>
+            </a:r>
             <a:endParaRPr lang="de-DE" sz="2800" dirty="0" smtClean="0"/>
           </a:p>
           <a:p>
             <a:r>
               <a:rPr lang="de-DE" sz="2800" dirty="0" smtClean="0"/>
-              <a:t>Forwards </a:t>
-            </a:r>
-            <a:r>
-              <a:rPr lang="de-DE" sz="2800" dirty="0" smtClean="0"/>
-              <a:t>Actions </a:t>
+              <a:t>Forwards Actions </a:t>
             </a:r>
             <a:r>
               <a:rPr lang="de-DE" sz="2800" dirty="0" err="1" smtClean="0"/>
@@ -6080,216 +5913,30 @@
           </a:p>
         </p:txBody>
       </p:sp>
-      <p:sp>
-        <p:nvSpPr>
-          <p:cNvPr id="4" name="Rechteck 3"/>
-          <p:cNvSpPr/>
+      <p:pic>
+        <p:nvPicPr>
+          <p:cNvPr id="10" name="Bild 9"/>
+          <p:cNvPicPr>
+            <a:picLocks noChangeAspect="1"/>
+          </p:cNvPicPr>
           <p:nvPr/>
-        </p:nvSpPr>
+        </p:nvPicPr>
+        <p:blipFill>
+          <a:blip r:embed="rId2"/>
+          <a:stretch>
+            <a:fillRect/>
+          </a:stretch>
+        </p:blipFill>
         <p:spPr>
           <a:xfrm>
-            <a:off x="683568" y="3789040"/>
-            <a:ext cx="2376264" cy="864096"/>
+            <a:off x="304800" y="2915742"/>
+            <a:ext cx="8407400" cy="3358058"/>
           </a:xfrm>
           <a:prstGeom prst="rect">
             <a:avLst/>
           </a:prstGeom>
         </p:spPr>
-        <p:style>
-          <a:lnRef idx="1">
-            <a:schemeClr val="accent1"/>
-          </a:lnRef>
-          <a:fillRef idx="3">
-            <a:schemeClr val="accent1"/>
-          </a:fillRef>
-          <a:effectRef idx="2">
-            <a:schemeClr val="accent1"/>
-          </a:effectRef>
-          <a:fontRef idx="minor">
-            <a:schemeClr val="lt1"/>
-          </a:fontRef>
-        </p:style>
-        <p:txBody>
-          <a:bodyPr rtlCol="0" anchor="ctr"/>
-          <a:lstStyle/>
-          <a:p>
-            <a:pPr algn="ctr"/>
-            <a:r>
-              <a:rPr lang="de-DE" dirty="0" smtClean="0"/>
-              <a:t>Action</a:t>
-            </a:r>
-            <a:endParaRPr lang="de-DE" dirty="0"/>
-          </a:p>
-        </p:txBody>
-      </p:sp>
-      <p:sp>
-        <p:nvSpPr>
-          <p:cNvPr id="5" name="Rechteck 4"/>
-          <p:cNvSpPr/>
-          <p:nvPr/>
-        </p:nvSpPr>
-        <p:spPr>
-          <a:xfrm>
-            <a:off x="3427516" y="2780928"/>
-            <a:ext cx="2448272" cy="3240360"/>
-          </a:xfrm>
-          <a:prstGeom prst="rect">
-            <a:avLst/>
-          </a:prstGeom>
-        </p:spPr>
-        <p:style>
-          <a:lnRef idx="1">
-            <a:schemeClr val="accent1"/>
-          </a:lnRef>
-          <a:fillRef idx="3">
-            <a:schemeClr val="accent1"/>
-          </a:fillRef>
-          <a:effectRef idx="2">
-            <a:schemeClr val="accent1"/>
-          </a:effectRef>
-          <a:fontRef idx="minor">
-            <a:schemeClr val="lt1"/>
-          </a:fontRef>
-        </p:style>
-        <p:txBody>
-          <a:bodyPr rtlCol="0" anchor="ctr"/>
-          <a:lstStyle/>
-          <a:p>
-            <a:pPr algn="ctr"/>
-            <a:r>
-              <a:rPr lang="de-DE" dirty="0" smtClean="0"/>
-              <a:t>Dispatcher</a:t>
-            </a:r>
-            <a:endParaRPr lang="de-DE" dirty="0"/>
-          </a:p>
-        </p:txBody>
-      </p:sp>
-      <p:sp>
-        <p:nvSpPr>
-          <p:cNvPr id="6" name="Rechteck 5"/>
-          <p:cNvSpPr/>
-          <p:nvPr/>
-        </p:nvSpPr>
-        <p:spPr>
-          <a:xfrm>
-            <a:off x="6372200" y="2924944"/>
-            <a:ext cx="2304256" cy="864096"/>
-          </a:xfrm>
-          <a:prstGeom prst="rect">
-            <a:avLst/>
-          </a:prstGeom>
-        </p:spPr>
-        <p:style>
-          <a:lnRef idx="1">
-            <a:schemeClr val="accent1"/>
-          </a:lnRef>
-          <a:fillRef idx="3">
-            <a:schemeClr val="accent1"/>
-          </a:fillRef>
-          <a:effectRef idx="2">
-            <a:schemeClr val="accent1"/>
-          </a:effectRef>
-          <a:fontRef idx="minor">
-            <a:schemeClr val="lt1"/>
-          </a:fontRef>
-        </p:style>
-        <p:txBody>
-          <a:bodyPr rtlCol="0" anchor="ctr"/>
-          <a:lstStyle/>
-          <a:p>
-            <a:pPr algn="ctr"/>
-            <a:r>
-              <a:rPr lang="de-DE" dirty="0" smtClean="0"/>
-              <a:t>Store 1</a:t>
-            </a:r>
-            <a:endParaRPr lang="de-DE" dirty="0"/>
-          </a:p>
-        </p:txBody>
-      </p:sp>
-      <p:sp>
-        <p:nvSpPr>
-          <p:cNvPr id="7" name="Rechteck 6"/>
-          <p:cNvSpPr/>
-          <p:nvPr/>
-        </p:nvSpPr>
-        <p:spPr>
-          <a:xfrm>
-            <a:off x="6372200" y="3941440"/>
-            <a:ext cx="2304256" cy="864096"/>
-          </a:xfrm>
-          <a:prstGeom prst="rect">
-            <a:avLst/>
-          </a:prstGeom>
-        </p:spPr>
-        <p:style>
-          <a:lnRef idx="1">
-            <a:schemeClr val="accent1"/>
-          </a:lnRef>
-          <a:fillRef idx="3">
-            <a:schemeClr val="accent1"/>
-          </a:fillRef>
-          <a:effectRef idx="2">
-            <a:schemeClr val="accent1"/>
-          </a:effectRef>
-          <a:fontRef idx="minor">
-            <a:schemeClr val="lt1"/>
-          </a:fontRef>
-        </p:style>
-        <p:txBody>
-          <a:bodyPr rtlCol="0" anchor="ctr"/>
-          <a:lstStyle/>
-          <a:p>
-            <a:pPr algn="ctr"/>
-            <a:r>
-              <a:rPr lang="de-DE" dirty="0" smtClean="0"/>
-              <a:t>Store 2</a:t>
-            </a:r>
-            <a:endParaRPr lang="de-DE" dirty="0"/>
-          </a:p>
-        </p:txBody>
-      </p:sp>
-      <p:sp>
-        <p:nvSpPr>
-          <p:cNvPr id="8" name="Rechteck 7"/>
-          <p:cNvSpPr/>
-          <p:nvPr/>
-        </p:nvSpPr>
-        <p:spPr>
-          <a:xfrm>
-            <a:off x="6372200" y="4935500"/>
-            <a:ext cx="2304256" cy="864096"/>
-          </a:xfrm>
-          <a:prstGeom prst="rect">
-            <a:avLst/>
-          </a:prstGeom>
-        </p:spPr>
-        <p:style>
-          <a:lnRef idx="1">
-            <a:schemeClr val="accent1"/>
-          </a:lnRef>
-          <a:fillRef idx="3">
-            <a:schemeClr val="accent1"/>
-          </a:fillRef>
-          <a:effectRef idx="2">
-            <a:schemeClr val="accent1"/>
-          </a:effectRef>
-          <a:fontRef idx="minor">
-            <a:schemeClr val="lt1"/>
-          </a:fontRef>
-        </p:style>
-        <p:txBody>
-          <a:bodyPr rtlCol="0" anchor="ctr"/>
-          <a:lstStyle/>
-          <a:p>
-            <a:pPr algn="ctr"/>
-            <a:r>
-              <a:rPr lang="de-DE" dirty="0" smtClean="0"/>
-              <a:t>Store 3</a:t>
-            </a:r>
-            <a:endParaRPr lang="de-DE" dirty="0"/>
-          </a:p>
-        </p:txBody>
-      </p:sp>
+      </p:pic>
     </p:spTree>
     <p:extLst>
       <p:ext uri="{BB962C8B-B14F-4D97-AF65-F5344CB8AC3E}">
@@ -6303,7 +5950,7 @@
   <p:timing>
     <p:tnLst>
       <p:par>
-        <p:cTn id="1" dur="indefinite" restart="never" nodeType="tmRoot"/>
+        <p:cTn xmlns:p14="http://schemas.microsoft.com/office/powerpoint/2010/main" id="1" dur="indefinite" restart="never" nodeType="tmRoot"/>
       </p:par>
     </p:tnLst>
   </p:timing>
@@ -6427,11 +6074,7 @@
             </a:r>
             <a:r>
               <a:rPr lang="de-DE" sz="2800" dirty="0" smtClean="0"/>
-              <a:t> Dispatcher </a:t>
-            </a:r>
-            <a:r>
-              <a:rPr lang="de-DE" sz="2800" dirty="0" smtClean="0"/>
-              <a:t>via </a:t>
+              <a:t> Dispatcher via </a:t>
             </a:r>
             <a:r>
               <a:rPr lang="de-DE" sz="2800" dirty="0" err="1" smtClean="0"/>
@@ -6462,11 +6105,7 @@
             </a:r>
             <a:r>
               <a:rPr lang="de-DE" sz="2800" dirty="0" smtClean="0"/>
-              <a:t> </a:t>
-            </a:r>
-            <a:r>
-              <a:rPr lang="de-DE" sz="2800" dirty="0" smtClean="0"/>
-              <a:t>Actions </a:t>
+              <a:t> Actions </a:t>
             </a:r>
             <a:r>
               <a:rPr lang="de-DE" sz="2800" dirty="0" err="1" smtClean="0"/>
@@ -6490,11 +6129,7 @@
             </a:r>
             <a:r>
               <a:rPr lang="de-DE" sz="2800" dirty="0" smtClean="0"/>
-              <a:t> </a:t>
-            </a:r>
-            <a:r>
-              <a:rPr lang="de-DE" sz="2800" dirty="0" smtClean="0"/>
-              <a:t>in (</a:t>
+              <a:t> in (</a:t>
             </a:r>
             <a:r>
               <a:rPr lang="de-DE" sz="2800" dirty="0" err="1" smtClean="0"/>
@@ -6520,7 +6155,6 @@
               <a:rPr lang="de-DE" sz="2800" dirty="0" smtClean="0"/>
               <a:t> type)</a:t>
             </a:r>
-            <a:endParaRPr lang="de-DE" sz="2800" dirty="0" smtClean="0"/>
           </a:p>
           <a:p>
             <a:r>
@@ -6560,38 +6194,6 @@
               <a:t>state</a:t>
             </a:r>
             <a:endParaRPr lang="de-DE" sz="2800" dirty="0" smtClean="0"/>
-          </a:p>
-          <a:p>
-            <a:pPr lvl="1"/>
-            <a:r>
-              <a:rPr lang="de-DE" sz="2400" dirty="0" err="1" smtClean="0"/>
-              <a:t>Allow</a:t>
-            </a:r>
-            <a:r>
-              <a:rPr lang="de-DE" sz="2400" dirty="0" smtClean="0"/>
-              <a:t> Components </a:t>
-            </a:r>
-            <a:r>
-              <a:rPr lang="de-DE" sz="2400" dirty="0" err="1" smtClean="0"/>
-              <a:t>to</a:t>
-            </a:r>
-            <a:r>
-              <a:rPr lang="de-DE" sz="2400" dirty="0" smtClean="0"/>
-              <a:t> </a:t>
-            </a:r>
-            <a:r>
-              <a:rPr lang="de-DE" sz="2400" dirty="0" err="1" smtClean="0"/>
-              <a:t>react</a:t>
-            </a:r>
-            <a:r>
-              <a:rPr lang="de-DE" sz="2400" dirty="0" smtClean="0"/>
-              <a:t> on </a:t>
-            </a:r>
-            <a:r>
-              <a:rPr lang="de-DE" sz="2400" dirty="0" err="1" smtClean="0"/>
-              <a:t>change</a:t>
-            </a:r>
-            <a:endParaRPr lang="de-DE" sz="2400" dirty="0" smtClean="0"/>
           </a:p>
           <a:p>
             <a:endParaRPr lang="de-DE" sz="2800" dirty="0" smtClean="0"/>
@@ -6638,155 +6240,30 @@
           </a:p>
         </p:txBody>
       </p:sp>
-      <p:sp>
-        <p:nvSpPr>
-          <p:cNvPr id="4" name="Textfeld 3"/>
-          <p:cNvSpPr txBox="1"/>
+      <p:pic>
+        <p:nvPicPr>
+          <p:cNvPr id="7" name="Bild 6"/>
+          <p:cNvPicPr>
+            <a:picLocks noChangeAspect="1"/>
+          </p:cNvPicPr>
           <p:nvPr/>
-        </p:nvSpPr>
+        </p:nvPicPr>
+        <p:blipFill>
+          <a:blip r:embed="rId2"/>
+          <a:stretch>
+            <a:fillRect/>
+          </a:stretch>
+        </p:blipFill>
         <p:spPr>
           <a:xfrm>
-            <a:off x="1259632" y="4365104"/>
-            <a:ext cx="3528392" cy="2308324"/>
+            <a:off x="991761" y="3695700"/>
+            <a:ext cx="7160479" cy="2641600"/>
           </a:xfrm>
           <a:prstGeom prst="rect">
             <a:avLst/>
           </a:prstGeom>
-          <a:noFill/>
         </p:spPr>
-        <p:txBody>
-          <a:bodyPr wrap="square" rtlCol="0">
-            <a:spAutoFit/>
-          </a:bodyPr>
-          <a:lstStyle/>
-          <a:p>
-            <a:r>
-              <a:rPr lang="de-DE" dirty="0" smtClean="0"/>
-              <a:t>Dummy </a:t>
-            </a:r>
-            <a:r>
-              <a:rPr lang="de-DE" dirty="0" err="1" smtClean="0"/>
-              <a:t>code</a:t>
-            </a:r>
-            <a:r>
-              <a:rPr lang="de-DE" dirty="0" smtClean="0"/>
-              <a:t>: </a:t>
-            </a:r>
-            <a:r>
-              <a:rPr lang="de-DE" dirty="0" err="1" smtClean="0"/>
-              <a:t>UserStore</a:t>
-            </a:r>
-            <a:r>
-              <a:rPr lang="de-DE" dirty="0" smtClean="0"/>
-              <a:t>: </a:t>
-            </a:r>
-          </a:p>
-          <a:p>
-            <a:r>
-              <a:rPr lang="de-DE" dirty="0" err="1" smtClean="0"/>
-              <a:t>onAction</a:t>
-            </a:r>
-            <a:r>
-              <a:rPr lang="de-DE" dirty="0" smtClean="0"/>
-              <a:t>(</a:t>
-            </a:r>
-            <a:r>
-              <a:rPr lang="de-DE" dirty="0" err="1" smtClean="0"/>
-              <a:t>action</a:t>
-            </a:r>
-            <a:r>
-              <a:rPr lang="de-DE" dirty="0" smtClean="0"/>
-              <a:t>) {</a:t>
-            </a:r>
-          </a:p>
-          <a:p>
-            <a:r>
-              <a:rPr lang="de-DE" dirty="0" err="1" smtClean="0"/>
-              <a:t>swtich</a:t>
-            </a:r>
-            <a:r>
-              <a:rPr lang="de-DE" dirty="0" smtClean="0"/>
-              <a:t> (</a:t>
-            </a:r>
-            <a:r>
-              <a:rPr lang="de-DE" dirty="0" err="1" smtClean="0"/>
-              <a:t>action.type</a:t>
-            </a:r>
-            <a:r>
-              <a:rPr lang="de-DE" dirty="0" smtClean="0"/>
-              <a:t>) {</a:t>
-            </a:r>
-          </a:p>
-          <a:p>
-            <a:r>
-              <a:rPr lang="de-DE" dirty="0"/>
-              <a:t> </a:t>
-            </a:r>
-            <a:r>
-              <a:rPr lang="de-DE" dirty="0" smtClean="0"/>
-              <a:t> </a:t>
-            </a:r>
-            <a:r>
-              <a:rPr lang="de-DE" dirty="0" err="1" smtClean="0"/>
-              <a:t>case</a:t>
-            </a:r>
-            <a:r>
-              <a:rPr lang="de-DE" dirty="0" smtClean="0"/>
-              <a:t> USER_ADDED:</a:t>
-            </a:r>
-          </a:p>
-          <a:p>
-            <a:r>
-              <a:rPr lang="de-DE" dirty="0"/>
-              <a:t> </a:t>
-            </a:r>
-            <a:r>
-              <a:rPr lang="de-DE" dirty="0" smtClean="0"/>
-              <a:t>  </a:t>
-            </a:r>
-            <a:r>
-              <a:rPr lang="de-DE" dirty="0" err="1" smtClean="0"/>
-              <a:t>this.users.push</a:t>
-            </a:r>
-            <a:r>
-              <a:rPr lang="de-DE" dirty="0" smtClean="0"/>
-              <a:t>([</a:t>
-            </a:r>
-            <a:r>
-              <a:rPr lang="de-DE" dirty="0" err="1" smtClean="0"/>
-              <a:t>user</a:t>
-            </a:r>
-            <a:r>
-              <a:rPr lang="de-DE" dirty="0" smtClean="0"/>
-              <a:t>: </a:t>
-            </a:r>
-            <a:r>
-              <a:rPr lang="de-DE" dirty="0" err="1" smtClean="0"/>
-              <a:t>action.user</a:t>
-            </a:r>
-            <a:r>
-              <a:rPr lang="de-DE" dirty="0" smtClean="0"/>
-              <a:t>]);</a:t>
-            </a:r>
-          </a:p>
-          <a:p>
-            <a:r>
-              <a:rPr lang="de-DE" dirty="0" err="1" smtClean="0"/>
-              <a:t>emitChangeEvent</a:t>
-            </a:r>
-            <a:r>
-              <a:rPr lang="de-DE" dirty="0" smtClean="0"/>
-              <a:t>();</a:t>
-            </a:r>
-          </a:p>
-          <a:p>
-            <a:r>
-              <a:rPr lang="de-DE" dirty="0"/>
-              <a:t>}</a:t>
-            </a:r>
-          </a:p>
-        </p:txBody>
-      </p:sp>
+      </p:pic>
     </p:spTree>
     <p:extLst>
       <p:ext uri="{BB962C8B-B14F-4D97-AF65-F5344CB8AC3E}">
@@ -6800,7 +6277,7 @@
   <p:timing>
     <p:tnLst>
       <p:par>
-        <p:cTn id="1" dur="indefinite" restart="never" nodeType="tmRoot"/>
+        <p:cTn xmlns:p14="http://schemas.microsoft.com/office/powerpoint/2010/main" id="1" dur="indefinite" restart="never" nodeType="tmRoot"/>
       </p:par>
     </p:tnLst>
   </p:timing>
@@ -6869,7 +6346,6 @@
               <a:rPr lang="de-DE" b="1" dirty="0" smtClean="0"/>
               <a:t>…</a:t>
             </a:r>
-            <a:endParaRPr lang="de-DE" b="1" dirty="0" smtClean="0"/>
           </a:p>
           <a:p>
             <a:pPr marL="0" indent="0">
@@ -6898,11 +6374,7 @@
           <a:p>
             <a:r>
               <a:rPr lang="de-DE" dirty="0" smtClean="0"/>
-              <a:t>UNI-DIRECTIONAL DATA </a:t>
-            </a:r>
-            <a:r>
-              <a:rPr lang="de-DE" dirty="0" smtClean="0"/>
-              <a:t>FLOW - EXAMPLES</a:t>
+              <a:t>UNI-DIRECTIONAL DATA FLOW - EXAMPLES</a:t>
             </a:r>
             <a:endParaRPr lang="de-DE" dirty="0"/>
           </a:p>
@@ -6945,7 +6417,7 @@
   <p:timing>
     <p:tnLst>
       <p:par>
-        <p:cTn id="1" dur="indefinite" restart="never" nodeType="tmRoot"/>
+        <p:cTn xmlns:p14="http://schemas.microsoft.com/office/powerpoint/2010/main" id="1" dur="indefinite" restart="never" nodeType="tmRoot"/>
       </p:par>
     </p:tnLst>
   </p:timing>
@@ -7481,7 +6953,7 @@
   <p:timing>
     <p:tnLst>
       <p:par>
-        <p:cTn id="1" dur="indefinite" restart="never" nodeType="tmRoot"/>
+        <p:cTn xmlns:p14="http://schemas.microsoft.com/office/powerpoint/2010/main" id="1" dur="indefinite" restart="never" nodeType="tmRoot"/>
       </p:par>
     </p:tnLst>
   </p:timing>
@@ -7681,7 +7153,7 @@
   <p:timing>
     <p:tnLst>
       <p:par>
-        <p:cTn id="1" dur="indefinite" restart="never" nodeType="tmRoot"/>
+        <p:cTn xmlns:p14="http://schemas.microsoft.com/office/powerpoint/2010/main" id="1" dur="indefinite" restart="never" nodeType="tmRoot"/>
       </p:par>
     </p:tnLst>
   </p:timing>
@@ -7796,7 +7268,6 @@
               <a:rPr lang="de-DE" dirty="0" smtClean="0"/>
               <a:t>“...</a:t>
             </a:r>
-            <a:endParaRPr lang="de-DE" dirty="0" smtClean="0"/>
           </a:p>
           <a:p>
             <a:pPr marL="0" indent="0">
@@ -7868,7 +7339,7 @@
   <p:timing>
     <p:tnLst>
       <p:par>
-        <p:cTn id="1" dur="indefinite" restart="never" nodeType="tmRoot"/>
+        <p:cTn xmlns:p14="http://schemas.microsoft.com/office/powerpoint/2010/main" id="1" dur="indefinite" restart="never" nodeType="tmRoot"/>
       </p:par>
     </p:tnLst>
   </p:timing>
@@ -8075,7 +7546,7 @@
   <p:timing>
     <p:tnLst>
       <p:par>
-        <p:cTn id="1" dur="indefinite" restart="never" nodeType="tmRoot"/>
+        <p:cTn xmlns:p14="http://schemas.microsoft.com/office/powerpoint/2010/main" id="1" dur="indefinite" restart="never" nodeType="tmRoot"/>
       </p:par>
     </p:tnLst>
   </p:timing>
@@ -8282,7 +7753,7 @@
   <p:timing>
     <p:tnLst>
       <p:par>
-        <p:cTn id="1" dur="indefinite" restart="never" nodeType="tmRoot"/>
+        <p:cTn xmlns:p14="http://schemas.microsoft.com/office/powerpoint/2010/main" id="1" dur="indefinite" restart="never" nodeType="tmRoot"/>
       </p:par>
     </p:tnLst>
   </p:timing>
@@ -8518,7 +7989,7 @@
   <p:timing>
     <p:tnLst>
       <p:par>
-        <p:cTn id="1" dur="indefinite" restart="never" nodeType="tmRoot"/>
+        <p:cTn xmlns:p14="http://schemas.microsoft.com/office/powerpoint/2010/main" id="1" dur="indefinite" restart="never" nodeType="tmRoot"/>
       </p:par>
     </p:tnLst>
   </p:timing>
@@ -9044,7 +8515,7 @@
   <p:timing>
     <p:tnLst>
       <p:par>
-        <p:cTn id="1" dur="indefinite" restart="never" nodeType="tmRoot"/>
+        <p:cTn xmlns:p14="http://schemas.microsoft.com/office/powerpoint/2010/main" id="1" dur="indefinite" restart="never" nodeType="tmRoot"/>
       </p:par>
     </p:tnLst>
   </p:timing>
@@ -9256,7 +8727,7 @@
   <p:timing>
     <p:tnLst>
       <p:par>
-        <p:cTn id="1" dur="indefinite" restart="never" nodeType="tmRoot"/>
+        <p:cTn xmlns:p14="http://schemas.microsoft.com/office/powerpoint/2010/main" id="1" dur="indefinite" restart="never" nodeType="tmRoot"/>
       </p:par>
     </p:tnLst>
   </p:timing>
@@ -9543,7 +9014,7 @@
   <p:timing>
     <p:tnLst>
       <p:par>
-        <p:cTn id="1" dur="indefinite" restart="never" nodeType="tmRoot"/>
+        <p:cTn xmlns:p14="http://schemas.microsoft.com/office/powerpoint/2010/main" id="1" dur="indefinite" restart="never" nodeType="tmRoot"/>
       </p:par>
     </p:tnLst>
   </p:timing>
@@ -9907,7 +9378,7 @@
   <p:timing>
     <p:tnLst>
       <p:par>
-        <p:cTn id="1" dur="indefinite" restart="never" nodeType="tmRoot"/>
+        <p:cTn xmlns:p14="http://schemas.microsoft.com/office/powerpoint/2010/main" id="1" dur="indefinite" restart="never" nodeType="tmRoot"/>
       </p:par>
     </p:tnLst>
   </p:timing>
@@ -10155,7 +9626,7 @@
   <p:timing>
     <p:tnLst>
       <p:par>
-        <p:cTn id="1" dur="indefinite" restart="never" nodeType="tmRoot"/>
+        <p:cTn xmlns:p14="http://schemas.microsoft.com/office/powerpoint/2010/main" id="1" dur="indefinite" restart="never" nodeType="tmRoot"/>
       </p:par>
     </p:tnLst>
   </p:timing>
@@ -10504,7 +9975,7 @@
   <p:timing>
     <p:tnLst>
       <p:par>
-        <p:cTn id="1" dur="indefinite" restart="never" nodeType="tmRoot"/>
+        <p:cTn xmlns:p14="http://schemas.microsoft.com/office/powerpoint/2010/main" id="1" dur="indefinite" restart="never" nodeType="tmRoot"/>
       </p:par>
     </p:tnLst>
   </p:timing>
@@ -10798,7 +10269,7 @@
   <p:timing>
     <p:tnLst>
       <p:par>
-        <p:cTn id="1" dur="indefinite" restart="never" nodeType="tmRoot"/>
+        <p:cTn xmlns:p14="http://schemas.microsoft.com/office/powerpoint/2010/main" id="1" dur="indefinite" restart="never" nodeType="tmRoot"/>
       </p:par>
     </p:tnLst>
   </p:timing>
@@ -10954,76 +10425,9 @@
           <a:p>
             <a:r>
               <a:rPr lang="de-DE" dirty="0" smtClean="0"/>
-              <a:t>UNI-DIRECTIONAL DATA </a:t>
-            </a:r>
-            <a:r>
-              <a:rPr lang="de-DE" dirty="0" smtClean="0"/>
-              <a:t>FLOW - 1</a:t>
+              <a:t>UNI-DIRECTIONAL DATA FLOW - 1</a:t>
             </a:r>
             <a:endParaRPr lang="de-DE" dirty="0"/>
-          </a:p>
-        </p:txBody>
-      </p:sp>
-      <p:pic>
-        <p:nvPicPr>
-          <p:cNvPr id="9" name="Bild 8"/>
-          <p:cNvPicPr>
-            <a:picLocks noChangeAspect="1"/>
-          </p:cNvPicPr>
-          <p:nvPr/>
-        </p:nvPicPr>
-        <p:blipFill>
-          <a:blip r:embed="rId2"/>
-          <a:stretch>
-            <a:fillRect/>
-          </a:stretch>
-        </p:blipFill>
-        <p:spPr>
-          <a:xfrm>
-            <a:off x="993757" y="1052736"/>
-            <a:ext cx="7156487" cy="2448272"/>
-          </a:xfrm>
-          <a:prstGeom prst="rect">
-            <a:avLst/>
-          </a:prstGeom>
-        </p:spPr>
-      </p:pic>
-      <p:sp>
-        <p:nvSpPr>
-          <p:cNvPr id="4" name="Ellipse 3"/>
-          <p:cNvSpPr/>
-          <p:nvPr/>
-        </p:nvSpPr>
-        <p:spPr>
-          <a:xfrm>
-            <a:off x="3635896" y="908720"/>
-            <a:ext cx="5112568" cy="1944216"/>
-          </a:xfrm>
-          <a:prstGeom prst="ellipse">
-            <a:avLst/>
-          </a:prstGeom>
-          <a:noFill/>
-        </p:spPr>
-        <p:style>
-          <a:lnRef idx="1">
-            <a:schemeClr val="accent1"/>
-          </a:lnRef>
-          <a:fillRef idx="3">
-            <a:schemeClr val="accent1"/>
-          </a:fillRef>
-          <a:effectRef idx="2">
-            <a:schemeClr val="accent1"/>
-          </a:effectRef>
-          <a:fontRef idx="minor">
-            <a:schemeClr val="lt1"/>
-          </a:fontRef>
-        </p:style>
-        <p:txBody>
-          <a:bodyPr rtlCol="0" anchor="ctr"/>
-          <a:lstStyle/>
-          <a:p>
-            <a:pPr algn="ctr"/>
-            <a:endParaRPr lang="de-DE"/>
           </a:p>
         </p:txBody>
       </p:sp>
@@ -11188,6 +10592,30 @@
           </a:p>
         </p:txBody>
       </p:sp>
+      <p:pic>
+        <p:nvPicPr>
+          <p:cNvPr id="5" name="Bild 4"/>
+          <p:cNvPicPr>
+            <a:picLocks noChangeAspect="1"/>
+          </p:cNvPicPr>
+          <p:nvPr/>
+        </p:nvPicPr>
+        <p:blipFill>
+          <a:blip r:embed="rId2"/>
+          <a:stretch>
+            <a:fillRect/>
+          </a:stretch>
+        </p:blipFill>
+        <p:spPr>
+          <a:xfrm>
+            <a:off x="3503176" y="1052736"/>
+            <a:ext cx="4741232" cy="1656183"/>
+          </a:xfrm>
+          <a:prstGeom prst="rect">
+            <a:avLst/>
+          </a:prstGeom>
+        </p:spPr>
+      </p:pic>
     </p:spTree>
     <p:extLst>
       <p:ext uri="{BB962C8B-B14F-4D97-AF65-F5344CB8AC3E}">
@@ -11201,7 +10629,7 @@
   <p:timing>
     <p:tnLst>
       <p:par>
-        <p:cTn id="1" dur="indefinite" restart="never" nodeType="tmRoot"/>
+        <p:cTn xmlns:p14="http://schemas.microsoft.com/office/powerpoint/2010/main" id="1" dur="indefinite" restart="never" nodeType="tmRoot"/>
       </p:par>
     </p:tnLst>
   </p:timing>

</xml_diff>

<commit_message>
Last bugfix and PDF
</commit_message>
<xml_diff>
--- a/Flux Introduction.pptx
+++ b/Flux Introduction.pptx
@@ -5,10 +5,10 @@
     <p:sldMasterId id="2147483648" r:id="rId1"/>
   </p:sldMasterIdLst>
   <p:notesMasterIdLst>
-    <p:notesMasterId r:id="rId27"/>
+    <p:notesMasterId r:id="rId25"/>
   </p:notesMasterIdLst>
   <p:handoutMasterIdLst>
-    <p:handoutMasterId r:id="rId28"/>
+    <p:handoutMasterId r:id="rId26"/>
   </p:handoutMasterIdLst>
   <p:sldIdLst>
     <p:sldId id="261" r:id="rId2"/>
@@ -24,18 +24,16 @@
     <p:sldId id="376" r:id="rId12"/>
     <p:sldId id="377" r:id="rId13"/>
     <p:sldId id="364" r:id="rId14"/>
-    <p:sldId id="381" r:id="rId15"/>
-    <p:sldId id="366" r:id="rId16"/>
-    <p:sldId id="378" r:id="rId17"/>
-    <p:sldId id="365" r:id="rId18"/>
-    <p:sldId id="367" r:id="rId19"/>
-    <p:sldId id="373" r:id="rId20"/>
-    <p:sldId id="370" r:id="rId21"/>
-    <p:sldId id="371" r:id="rId22"/>
-    <p:sldId id="372" r:id="rId23"/>
-    <p:sldId id="379" r:id="rId24"/>
-    <p:sldId id="359" r:id="rId25"/>
-    <p:sldId id="380" r:id="rId26"/>
+    <p:sldId id="366" r:id="rId15"/>
+    <p:sldId id="378" r:id="rId16"/>
+    <p:sldId id="365" r:id="rId17"/>
+    <p:sldId id="367" r:id="rId18"/>
+    <p:sldId id="373" r:id="rId19"/>
+    <p:sldId id="370" r:id="rId20"/>
+    <p:sldId id="371" r:id="rId21"/>
+    <p:sldId id="372" r:id="rId22"/>
+    <p:sldId id="359" r:id="rId23"/>
+    <p:sldId id="380" r:id="rId24"/>
   </p:sldIdLst>
   <p:sldSz cx="9144000" cy="6858000" type="screen4x3"/>
   <p:notesSz cx="6858000" cy="9144000"/>
@@ -136,7 +134,7 @@
   </p:defaultTextStyle>
   <p:extLst>
     <p:ext uri="{EFAFB233-063F-42B5-8137-9DF3F51BA10A}">
-      <p15:sldGuideLst xmlns="" xmlns:p15="http://schemas.microsoft.com/office/powerpoint/2012/main">
+      <p15:sldGuideLst xmlns:p15="http://schemas.microsoft.com/office/powerpoint/2012/main" xmlns="">
         <p15:guide id="1" orient="horz" pos="3300">
           <p15:clr>
             <a:srgbClr val="A4A3A4"/>
@@ -716,11 +714,7 @@
           <a:bodyPr/>
           <a:lstStyle/>
           <a:p>
-            <a:r>
-              <a:rPr lang="de-DE" dirty="0" smtClean="0"/>
-              <a:t>RENE</a:t>
-            </a:r>
-            <a:endParaRPr lang="de-DE" dirty="0"/>
+            <a:endParaRPr lang="de-DE"/>
           </a:p>
         </p:txBody>
       </p:sp>
@@ -739,10 +733,10 @@
           <a:bodyPr/>
           <a:lstStyle/>
           <a:p>
-            <a:fld id="{D86164CF-F871-3D47-A661-2FEA5BB7AC1F}" type="slidenum">
+            <a:fld id="{446AC1AA-0751-8243-836D-342D444A6997}" type="slidenum">
               <a:rPr lang="de-DE" smtClean="0"/>
               <a:pPr/>
-              <a:t>3</a:t>
+              <a:t>1</a:t>
             </a:fld>
             <a:endParaRPr lang="de-DE"/>
           </a:p>
@@ -751,7 +745,857 @@
     </p:spTree>
     <p:extLst>
       <p:ext uri="{BB962C8B-B14F-4D97-AF65-F5344CB8AC3E}">
-        <p14:creationId xmlns:p14="http://schemas.microsoft.com/office/powerpoint/2010/main" val="3749290873"/>
+        <p14:creationId xmlns:p14="http://schemas.microsoft.com/office/powerpoint/2010/main" val="1401868528"/>
+      </p:ext>
+    </p:extLst>
+  </p:cSld>
+  <p:clrMapOvr>
+    <a:masterClrMapping/>
+  </p:clrMapOvr>
+</p:notes>
+</file>
+
+<file path=ppt/notesSlides/notesSlide10.xml><?xml version="1.0" encoding="utf-8"?>
+<p:notes xmlns:a="http://schemas.openxmlformats.org/drawingml/2006/main" xmlns:r="http://schemas.openxmlformats.org/officeDocument/2006/relationships" xmlns:p="http://schemas.openxmlformats.org/presentationml/2006/main">
+  <p:cSld>
+    <p:spTree>
+      <p:nvGrpSpPr>
+        <p:cNvPr id="1" name=""/>
+        <p:cNvGrpSpPr/>
+        <p:nvPr/>
+      </p:nvGrpSpPr>
+      <p:grpSpPr>
+        <a:xfrm>
+          <a:off x="0" y="0"/>
+          <a:ext cx="0" cy="0"/>
+          <a:chOff x="0" y="0"/>
+          <a:chExt cx="0" cy="0"/>
+        </a:xfrm>
+      </p:grpSpPr>
+      <p:sp>
+        <p:nvSpPr>
+          <p:cNvPr id="2" name="Folienbildplatzhalter 1"/>
+          <p:cNvSpPr>
+            <a:spLocks noGrp="1" noRot="1" noChangeAspect="1"/>
+          </p:cNvSpPr>
+          <p:nvPr>
+            <p:ph type="sldImg"/>
+          </p:nvPr>
+        </p:nvSpPr>
+        <p:spPr/>
+      </p:sp>
+      <p:sp>
+        <p:nvSpPr>
+          <p:cNvPr id="3" name="Notizenplatzhalter 2"/>
+          <p:cNvSpPr>
+            <a:spLocks noGrp="1"/>
+          </p:cNvSpPr>
+          <p:nvPr>
+            <p:ph type="body" idx="1"/>
+          </p:nvPr>
+        </p:nvSpPr>
+        <p:spPr/>
+        <p:txBody>
+          <a:bodyPr/>
+          <a:lstStyle/>
+          <a:p>
+            <a:endParaRPr lang="de-DE"/>
+          </a:p>
+        </p:txBody>
+      </p:sp>
+      <p:sp>
+        <p:nvSpPr>
+          <p:cNvPr id="4" name="Foliennummernplatzhalter 3"/>
+          <p:cNvSpPr>
+            <a:spLocks noGrp="1"/>
+          </p:cNvSpPr>
+          <p:nvPr>
+            <p:ph type="sldNum" sz="quarter" idx="10"/>
+          </p:nvPr>
+        </p:nvSpPr>
+        <p:spPr/>
+        <p:txBody>
+          <a:bodyPr/>
+          <a:lstStyle/>
+          <a:p>
+            <a:fld id="{446AC1AA-0751-8243-836D-342D444A6997}" type="slidenum">
+              <a:rPr lang="de-DE" smtClean="0"/>
+              <a:pPr/>
+              <a:t>10</a:t>
+            </a:fld>
+            <a:endParaRPr lang="de-DE"/>
+          </a:p>
+        </p:txBody>
+      </p:sp>
+    </p:spTree>
+    <p:extLst>
+      <p:ext uri="{BB962C8B-B14F-4D97-AF65-F5344CB8AC3E}">
+        <p14:creationId xmlns:p14="http://schemas.microsoft.com/office/powerpoint/2010/main" val="3620167657"/>
+      </p:ext>
+    </p:extLst>
+  </p:cSld>
+  <p:clrMapOvr>
+    <a:masterClrMapping/>
+  </p:clrMapOvr>
+</p:notes>
+</file>
+
+<file path=ppt/notesSlides/notesSlide11.xml><?xml version="1.0" encoding="utf-8"?>
+<p:notes xmlns:a="http://schemas.openxmlformats.org/drawingml/2006/main" xmlns:r="http://schemas.openxmlformats.org/officeDocument/2006/relationships" xmlns:p="http://schemas.openxmlformats.org/presentationml/2006/main">
+  <p:cSld>
+    <p:spTree>
+      <p:nvGrpSpPr>
+        <p:cNvPr id="1" name=""/>
+        <p:cNvGrpSpPr/>
+        <p:nvPr/>
+      </p:nvGrpSpPr>
+      <p:grpSpPr>
+        <a:xfrm>
+          <a:off x="0" y="0"/>
+          <a:ext cx="0" cy="0"/>
+          <a:chOff x="0" y="0"/>
+          <a:chExt cx="0" cy="0"/>
+        </a:xfrm>
+      </p:grpSpPr>
+      <p:sp>
+        <p:nvSpPr>
+          <p:cNvPr id="2" name="Folienbildplatzhalter 1"/>
+          <p:cNvSpPr>
+            <a:spLocks noGrp="1" noRot="1" noChangeAspect="1"/>
+          </p:cNvSpPr>
+          <p:nvPr>
+            <p:ph type="sldImg"/>
+          </p:nvPr>
+        </p:nvSpPr>
+        <p:spPr/>
+      </p:sp>
+      <p:sp>
+        <p:nvSpPr>
+          <p:cNvPr id="3" name="Notizenplatzhalter 2"/>
+          <p:cNvSpPr>
+            <a:spLocks noGrp="1"/>
+          </p:cNvSpPr>
+          <p:nvPr>
+            <p:ph type="body" idx="1"/>
+          </p:nvPr>
+        </p:nvSpPr>
+        <p:spPr/>
+        <p:txBody>
+          <a:bodyPr/>
+          <a:lstStyle/>
+          <a:p>
+            <a:endParaRPr lang="de-DE"/>
+          </a:p>
+        </p:txBody>
+      </p:sp>
+      <p:sp>
+        <p:nvSpPr>
+          <p:cNvPr id="4" name="Foliennummernplatzhalter 3"/>
+          <p:cNvSpPr>
+            <a:spLocks noGrp="1"/>
+          </p:cNvSpPr>
+          <p:nvPr>
+            <p:ph type="sldNum" sz="quarter" idx="10"/>
+          </p:nvPr>
+        </p:nvSpPr>
+        <p:spPr/>
+        <p:txBody>
+          <a:bodyPr/>
+          <a:lstStyle/>
+          <a:p>
+            <a:fld id="{446AC1AA-0751-8243-836D-342D444A6997}" type="slidenum">
+              <a:rPr lang="de-DE" smtClean="0"/>
+              <a:pPr/>
+              <a:t>11</a:t>
+            </a:fld>
+            <a:endParaRPr lang="de-DE"/>
+          </a:p>
+        </p:txBody>
+      </p:sp>
+    </p:spTree>
+    <p:extLst>
+      <p:ext uri="{BB962C8B-B14F-4D97-AF65-F5344CB8AC3E}">
+        <p14:creationId xmlns:p14="http://schemas.microsoft.com/office/powerpoint/2010/main" val="4192819277"/>
+      </p:ext>
+    </p:extLst>
+  </p:cSld>
+  <p:clrMapOvr>
+    <a:masterClrMapping/>
+  </p:clrMapOvr>
+</p:notes>
+</file>
+
+<file path=ppt/notesSlides/notesSlide12.xml><?xml version="1.0" encoding="utf-8"?>
+<p:notes xmlns:a="http://schemas.openxmlformats.org/drawingml/2006/main" xmlns:r="http://schemas.openxmlformats.org/officeDocument/2006/relationships" xmlns:p="http://schemas.openxmlformats.org/presentationml/2006/main">
+  <p:cSld>
+    <p:spTree>
+      <p:nvGrpSpPr>
+        <p:cNvPr id="1" name=""/>
+        <p:cNvGrpSpPr/>
+        <p:nvPr/>
+      </p:nvGrpSpPr>
+      <p:grpSpPr>
+        <a:xfrm>
+          <a:off x="0" y="0"/>
+          <a:ext cx="0" cy="0"/>
+          <a:chOff x="0" y="0"/>
+          <a:chExt cx="0" cy="0"/>
+        </a:xfrm>
+      </p:grpSpPr>
+      <p:sp>
+        <p:nvSpPr>
+          <p:cNvPr id="2" name="Folienbildplatzhalter 1"/>
+          <p:cNvSpPr>
+            <a:spLocks noGrp="1" noRot="1" noChangeAspect="1"/>
+          </p:cNvSpPr>
+          <p:nvPr>
+            <p:ph type="sldImg"/>
+          </p:nvPr>
+        </p:nvSpPr>
+        <p:spPr/>
+      </p:sp>
+      <p:sp>
+        <p:nvSpPr>
+          <p:cNvPr id="3" name="Notizenplatzhalter 2"/>
+          <p:cNvSpPr>
+            <a:spLocks noGrp="1"/>
+          </p:cNvSpPr>
+          <p:nvPr>
+            <p:ph type="body" idx="1"/>
+          </p:nvPr>
+        </p:nvSpPr>
+        <p:spPr/>
+        <p:txBody>
+          <a:bodyPr/>
+          <a:lstStyle/>
+          <a:p>
+            <a:endParaRPr lang="de-DE"/>
+          </a:p>
+        </p:txBody>
+      </p:sp>
+      <p:sp>
+        <p:nvSpPr>
+          <p:cNvPr id="4" name="Foliennummernplatzhalter 3"/>
+          <p:cNvSpPr>
+            <a:spLocks noGrp="1"/>
+          </p:cNvSpPr>
+          <p:nvPr>
+            <p:ph type="sldNum" sz="quarter" idx="10"/>
+          </p:nvPr>
+        </p:nvSpPr>
+        <p:spPr/>
+        <p:txBody>
+          <a:bodyPr/>
+          <a:lstStyle/>
+          <a:p>
+            <a:fld id="{446AC1AA-0751-8243-836D-342D444A6997}" type="slidenum">
+              <a:rPr lang="de-DE" smtClean="0"/>
+              <a:pPr/>
+              <a:t>12</a:t>
+            </a:fld>
+            <a:endParaRPr lang="de-DE"/>
+          </a:p>
+        </p:txBody>
+      </p:sp>
+    </p:spTree>
+    <p:extLst>
+      <p:ext uri="{BB962C8B-B14F-4D97-AF65-F5344CB8AC3E}">
+        <p14:creationId xmlns:p14="http://schemas.microsoft.com/office/powerpoint/2010/main" val="724595870"/>
+      </p:ext>
+    </p:extLst>
+  </p:cSld>
+  <p:clrMapOvr>
+    <a:masterClrMapping/>
+  </p:clrMapOvr>
+</p:notes>
+</file>
+
+<file path=ppt/notesSlides/notesSlide13.xml><?xml version="1.0" encoding="utf-8"?>
+<p:notes xmlns:a="http://schemas.openxmlformats.org/drawingml/2006/main" xmlns:r="http://schemas.openxmlformats.org/officeDocument/2006/relationships" xmlns:p="http://schemas.openxmlformats.org/presentationml/2006/main">
+  <p:cSld>
+    <p:spTree>
+      <p:nvGrpSpPr>
+        <p:cNvPr id="1" name=""/>
+        <p:cNvGrpSpPr/>
+        <p:nvPr/>
+      </p:nvGrpSpPr>
+      <p:grpSpPr>
+        <a:xfrm>
+          <a:off x="0" y="0"/>
+          <a:ext cx="0" cy="0"/>
+          <a:chOff x="0" y="0"/>
+          <a:chExt cx="0" cy="0"/>
+        </a:xfrm>
+      </p:grpSpPr>
+      <p:sp>
+        <p:nvSpPr>
+          <p:cNvPr id="2" name="Folienbildplatzhalter 1"/>
+          <p:cNvSpPr>
+            <a:spLocks noGrp="1" noRot="1" noChangeAspect="1"/>
+          </p:cNvSpPr>
+          <p:nvPr>
+            <p:ph type="sldImg"/>
+          </p:nvPr>
+        </p:nvSpPr>
+        <p:spPr/>
+      </p:sp>
+      <p:sp>
+        <p:nvSpPr>
+          <p:cNvPr id="3" name="Notizenplatzhalter 2"/>
+          <p:cNvSpPr>
+            <a:spLocks noGrp="1"/>
+          </p:cNvSpPr>
+          <p:nvPr>
+            <p:ph type="body" idx="1"/>
+          </p:nvPr>
+        </p:nvSpPr>
+        <p:spPr/>
+        <p:txBody>
+          <a:bodyPr/>
+          <a:lstStyle/>
+          <a:p>
+            <a:endParaRPr lang="de-DE"/>
+          </a:p>
+        </p:txBody>
+      </p:sp>
+      <p:sp>
+        <p:nvSpPr>
+          <p:cNvPr id="4" name="Foliennummernplatzhalter 3"/>
+          <p:cNvSpPr>
+            <a:spLocks noGrp="1"/>
+          </p:cNvSpPr>
+          <p:nvPr>
+            <p:ph type="sldNum" sz="quarter" idx="10"/>
+          </p:nvPr>
+        </p:nvSpPr>
+        <p:spPr/>
+        <p:txBody>
+          <a:bodyPr/>
+          <a:lstStyle/>
+          <a:p>
+            <a:fld id="{446AC1AA-0751-8243-836D-342D444A6997}" type="slidenum">
+              <a:rPr lang="de-DE" smtClean="0"/>
+              <a:pPr/>
+              <a:t>13</a:t>
+            </a:fld>
+            <a:endParaRPr lang="de-DE"/>
+          </a:p>
+        </p:txBody>
+      </p:sp>
+    </p:spTree>
+    <p:extLst>
+      <p:ext uri="{BB962C8B-B14F-4D97-AF65-F5344CB8AC3E}">
+        <p14:creationId xmlns:p14="http://schemas.microsoft.com/office/powerpoint/2010/main" val="19840999"/>
+      </p:ext>
+    </p:extLst>
+  </p:cSld>
+  <p:clrMapOvr>
+    <a:masterClrMapping/>
+  </p:clrMapOvr>
+</p:notes>
+</file>
+
+<file path=ppt/notesSlides/notesSlide14.xml><?xml version="1.0" encoding="utf-8"?>
+<p:notes xmlns:a="http://schemas.openxmlformats.org/drawingml/2006/main" xmlns:r="http://schemas.openxmlformats.org/officeDocument/2006/relationships" xmlns:p="http://schemas.openxmlformats.org/presentationml/2006/main">
+  <p:cSld>
+    <p:spTree>
+      <p:nvGrpSpPr>
+        <p:cNvPr id="1" name=""/>
+        <p:cNvGrpSpPr/>
+        <p:nvPr/>
+      </p:nvGrpSpPr>
+      <p:grpSpPr>
+        <a:xfrm>
+          <a:off x="0" y="0"/>
+          <a:ext cx="0" cy="0"/>
+          <a:chOff x="0" y="0"/>
+          <a:chExt cx="0" cy="0"/>
+        </a:xfrm>
+      </p:grpSpPr>
+      <p:sp>
+        <p:nvSpPr>
+          <p:cNvPr id="2" name="Folienbildplatzhalter 1"/>
+          <p:cNvSpPr>
+            <a:spLocks noGrp="1" noRot="1" noChangeAspect="1"/>
+          </p:cNvSpPr>
+          <p:nvPr>
+            <p:ph type="sldImg"/>
+          </p:nvPr>
+        </p:nvSpPr>
+        <p:spPr/>
+      </p:sp>
+      <p:sp>
+        <p:nvSpPr>
+          <p:cNvPr id="3" name="Notizenplatzhalter 2"/>
+          <p:cNvSpPr>
+            <a:spLocks noGrp="1"/>
+          </p:cNvSpPr>
+          <p:nvPr>
+            <p:ph type="body" idx="1"/>
+          </p:nvPr>
+        </p:nvSpPr>
+        <p:spPr/>
+        <p:txBody>
+          <a:bodyPr/>
+          <a:lstStyle/>
+          <a:p>
+            <a:endParaRPr lang="de-DE"/>
+          </a:p>
+        </p:txBody>
+      </p:sp>
+      <p:sp>
+        <p:nvSpPr>
+          <p:cNvPr id="4" name="Foliennummernplatzhalter 3"/>
+          <p:cNvSpPr>
+            <a:spLocks noGrp="1"/>
+          </p:cNvSpPr>
+          <p:nvPr>
+            <p:ph type="sldNum" sz="quarter" idx="10"/>
+          </p:nvPr>
+        </p:nvSpPr>
+        <p:spPr/>
+        <p:txBody>
+          <a:bodyPr/>
+          <a:lstStyle/>
+          <a:p>
+            <a:fld id="{446AC1AA-0751-8243-836D-342D444A6997}" type="slidenum">
+              <a:rPr lang="de-DE" smtClean="0"/>
+              <a:pPr/>
+              <a:t>14</a:t>
+            </a:fld>
+            <a:endParaRPr lang="de-DE"/>
+          </a:p>
+        </p:txBody>
+      </p:sp>
+    </p:spTree>
+    <p:extLst>
+      <p:ext uri="{BB962C8B-B14F-4D97-AF65-F5344CB8AC3E}">
+        <p14:creationId xmlns:p14="http://schemas.microsoft.com/office/powerpoint/2010/main" val="1206115165"/>
+      </p:ext>
+    </p:extLst>
+  </p:cSld>
+  <p:clrMapOvr>
+    <a:masterClrMapping/>
+  </p:clrMapOvr>
+</p:notes>
+</file>
+
+<file path=ppt/notesSlides/notesSlide15.xml><?xml version="1.0" encoding="utf-8"?>
+<p:notes xmlns:a="http://schemas.openxmlformats.org/drawingml/2006/main" xmlns:r="http://schemas.openxmlformats.org/officeDocument/2006/relationships" xmlns:p="http://schemas.openxmlformats.org/presentationml/2006/main">
+  <p:cSld>
+    <p:spTree>
+      <p:nvGrpSpPr>
+        <p:cNvPr id="1" name=""/>
+        <p:cNvGrpSpPr/>
+        <p:nvPr/>
+      </p:nvGrpSpPr>
+      <p:grpSpPr>
+        <a:xfrm>
+          <a:off x="0" y="0"/>
+          <a:ext cx="0" cy="0"/>
+          <a:chOff x="0" y="0"/>
+          <a:chExt cx="0" cy="0"/>
+        </a:xfrm>
+      </p:grpSpPr>
+      <p:sp>
+        <p:nvSpPr>
+          <p:cNvPr id="2" name="Folienbildplatzhalter 1"/>
+          <p:cNvSpPr>
+            <a:spLocks noGrp="1" noRot="1" noChangeAspect="1"/>
+          </p:cNvSpPr>
+          <p:nvPr>
+            <p:ph type="sldImg"/>
+          </p:nvPr>
+        </p:nvSpPr>
+        <p:spPr/>
+      </p:sp>
+      <p:sp>
+        <p:nvSpPr>
+          <p:cNvPr id="3" name="Notizenplatzhalter 2"/>
+          <p:cNvSpPr>
+            <a:spLocks noGrp="1"/>
+          </p:cNvSpPr>
+          <p:nvPr>
+            <p:ph type="body" idx="1"/>
+          </p:nvPr>
+        </p:nvSpPr>
+        <p:spPr/>
+        <p:txBody>
+          <a:bodyPr/>
+          <a:lstStyle/>
+          <a:p>
+            <a:endParaRPr lang="de-DE"/>
+          </a:p>
+        </p:txBody>
+      </p:sp>
+      <p:sp>
+        <p:nvSpPr>
+          <p:cNvPr id="4" name="Foliennummernplatzhalter 3"/>
+          <p:cNvSpPr>
+            <a:spLocks noGrp="1"/>
+          </p:cNvSpPr>
+          <p:nvPr>
+            <p:ph type="sldNum" sz="quarter" idx="10"/>
+          </p:nvPr>
+        </p:nvSpPr>
+        <p:spPr/>
+        <p:txBody>
+          <a:bodyPr/>
+          <a:lstStyle/>
+          <a:p>
+            <a:fld id="{446AC1AA-0751-8243-836D-342D444A6997}" type="slidenum">
+              <a:rPr lang="de-DE" smtClean="0"/>
+              <a:pPr/>
+              <a:t>15</a:t>
+            </a:fld>
+            <a:endParaRPr lang="de-DE"/>
+          </a:p>
+        </p:txBody>
+      </p:sp>
+    </p:spTree>
+    <p:extLst>
+      <p:ext uri="{BB962C8B-B14F-4D97-AF65-F5344CB8AC3E}">
+        <p14:creationId xmlns:p14="http://schemas.microsoft.com/office/powerpoint/2010/main" val="1531232132"/>
+      </p:ext>
+    </p:extLst>
+  </p:cSld>
+  <p:clrMapOvr>
+    <a:masterClrMapping/>
+  </p:clrMapOvr>
+</p:notes>
+</file>
+
+<file path=ppt/notesSlides/notesSlide16.xml><?xml version="1.0" encoding="utf-8"?>
+<p:notes xmlns:a="http://schemas.openxmlformats.org/drawingml/2006/main" xmlns:r="http://schemas.openxmlformats.org/officeDocument/2006/relationships" xmlns:p="http://schemas.openxmlformats.org/presentationml/2006/main">
+  <p:cSld>
+    <p:spTree>
+      <p:nvGrpSpPr>
+        <p:cNvPr id="1" name=""/>
+        <p:cNvGrpSpPr/>
+        <p:nvPr/>
+      </p:nvGrpSpPr>
+      <p:grpSpPr>
+        <a:xfrm>
+          <a:off x="0" y="0"/>
+          <a:ext cx="0" cy="0"/>
+          <a:chOff x="0" y="0"/>
+          <a:chExt cx="0" cy="0"/>
+        </a:xfrm>
+      </p:grpSpPr>
+      <p:sp>
+        <p:nvSpPr>
+          <p:cNvPr id="2" name="Folienbildplatzhalter 1"/>
+          <p:cNvSpPr>
+            <a:spLocks noGrp="1" noRot="1" noChangeAspect="1"/>
+          </p:cNvSpPr>
+          <p:nvPr>
+            <p:ph type="sldImg"/>
+          </p:nvPr>
+        </p:nvSpPr>
+        <p:spPr/>
+      </p:sp>
+      <p:sp>
+        <p:nvSpPr>
+          <p:cNvPr id="3" name="Notizenplatzhalter 2"/>
+          <p:cNvSpPr>
+            <a:spLocks noGrp="1"/>
+          </p:cNvSpPr>
+          <p:nvPr>
+            <p:ph type="body" idx="1"/>
+          </p:nvPr>
+        </p:nvSpPr>
+        <p:spPr/>
+        <p:txBody>
+          <a:bodyPr/>
+          <a:lstStyle/>
+          <a:p>
+            <a:endParaRPr lang="de-DE"/>
+          </a:p>
+        </p:txBody>
+      </p:sp>
+      <p:sp>
+        <p:nvSpPr>
+          <p:cNvPr id="4" name="Foliennummernplatzhalter 3"/>
+          <p:cNvSpPr>
+            <a:spLocks noGrp="1"/>
+          </p:cNvSpPr>
+          <p:nvPr>
+            <p:ph type="sldNum" sz="quarter" idx="10"/>
+          </p:nvPr>
+        </p:nvSpPr>
+        <p:spPr/>
+        <p:txBody>
+          <a:bodyPr/>
+          <a:lstStyle/>
+          <a:p>
+            <a:fld id="{446AC1AA-0751-8243-836D-342D444A6997}" type="slidenum">
+              <a:rPr lang="de-DE" smtClean="0"/>
+              <a:pPr/>
+              <a:t>16</a:t>
+            </a:fld>
+            <a:endParaRPr lang="de-DE"/>
+          </a:p>
+        </p:txBody>
+      </p:sp>
+    </p:spTree>
+    <p:extLst>
+      <p:ext uri="{BB962C8B-B14F-4D97-AF65-F5344CB8AC3E}">
+        <p14:creationId xmlns:p14="http://schemas.microsoft.com/office/powerpoint/2010/main" val="1780627983"/>
+      </p:ext>
+    </p:extLst>
+  </p:cSld>
+  <p:clrMapOvr>
+    <a:masterClrMapping/>
+  </p:clrMapOvr>
+</p:notes>
+</file>
+
+<file path=ppt/notesSlides/notesSlide17.xml><?xml version="1.0" encoding="utf-8"?>
+<p:notes xmlns:a="http://schemas.openxmlformats.org/drawingml/2006/main" xmlns:r="http://schemas.openxmlformats.org/officeDocument/2006/relationships" xmlns:p="http://schemas.openxmlformats.org/presentationml/2006/main">
+  <p:cSld>
+    <p:spTree>
+      <p:nvGrpSpPr>
+        <p:cNvPr id="1" name=""/>
+        <p:cNvGrpSpPr/>
+        <p:nvPr/>
+      </p:nvGrpSpPr>
+      <p:grpSpPr>
+        <a:xfrm>
+          <a:off x="0" y="0"/>
+          <a:ext cx="0" cy="0"/>
+          <a:chOff x="0" y="0"/>
+          <a:chExt cx="0" cy="0"/>
+        </a:xfrm>
+      </p:grpSpPr>
+      <p:sp>
+        <p:nvSpPr>
+          <p:cNvPr id="2" name="Folienbildplatzhalter 1"/>
+          <p:cNvSpPr>
+            <a:spLocks noGrp="1" noRot="1" noChangeAspect="1"/>
+          </p:cNvSpPr>
+          <p:nvPr>
+            <p:ph type="sldImg"/>
+          </p:nvPr>
+        </p:nvSpPr>
+        <p:spPr/>
+      </p:sp>
+      <p:sp>
+        <p:nvSpPr>
+          <p:cNvPr id="3" name="Notizenplatzhalter 2"/>
+          <p:cNvSpPr>
+            <a:spLocks noGrp="1"/>
+          </p:cNvSpPr>
+          <p:nvPr>
+            <p:ph type="body" idx="1"/>
+          </p:nvPr>
+        </p:nvSpPr>
+        <p:spPr/>
+        <p:txBody>
+          <a:bodyPr/>
+          <a:lstStyle/>
+          <a:p>
+            <a:endParaRPr lang="de-DE"/>
+          </a:p>
+        </p:txBody>
+      </p:sp>
+      <p:sp>
+        <p:nvSpPr>
+          <p:cNvPr id="4" name="Foliennummernplatzhalter 3"/>
+          <p:cNvSpPr>
+            <a:spLocks noGrp="1"/>
+          </p:cNvSpPr>
+          <p:nvPr>
+            <p:ph type="sldNum" sz="quarter" idx="10"/>
+          </p:nvPr>
+        </p:nvSpPr>
+        <p:spPr/>
+        <p:txBody>
+          <a:bodyPr/>
+          <a:lstStyle/>
+          <a:p>
+            <a:fld id="{446AC1AA-0751-8243-836D-342D444A6997}" type="slidenum">
+              <a:rPr lang="de-DE" smtClean="0"/>
+              <a:pPr/>
+              <a:t>17</a:t>
+            </a:fld>
+            <a:endParaRPr lang="de-DE"/>
+          </a:p>
+        </p:txBody>
+      </p:sp>
+    </p:spTree>
+    <p:extLst>
+      <p:ext uri="{BB962C8B-B14F-4D97-AF65-F5344CB8AC3E}">
+        <p14:creationId xmlns:p14="http://schemas.microsoft.com/office/powerpoint/2010/main" val="2446523474"/>
+      </p:ext>
+    </p:extLst>
+  </p:cSld>
+  <p:clrMapOvr>
+    <a:masterClrMapping/>
+  </p:clrMapOvr>
+</p:notes>
+</file>
+
+<file path=ppt/notesSlides/notesSlide18.xml><?xml version="1.0" encoding="utf-8"?>
+<p:notes xmlns:a="http://schemas.openxmlformats.org/drawingml/2006/main" xmlns:r="http://schemas.openxmlformats.org/officeDocument/2006/relationships" xmlns:p="http://schemas.openxmlformats.org/presentationml/2006/main">
+  <p:cSld>
+    <p:spTree>
+      <p:nvGrpSpPr>
+        <p:cNvPr id="1" name=""/>
+        <p:cNvGrpSpPr/>
+        <p:nvPr/>
+      </p:nvGrpSpPr>
+      <p:grpSpPr>
+        <a:xfrm>
+          <a:off x="0" y="0"/>
+          <a:ext cx="0" cy="0"/>
+          <a:chOff x="0" y="0"/>
+          <a:chExt cx="0" cy="0"/>
+        </a:xfrm>
+      </p:grpSpPr>
+      <p:sp>
+        <p:nvSpPr>
+          <p:cNvPr id="2" name="Folienbildplatzhalter 1"/>
+          <p:cNvSpPr>
+            <a:spLocks noGrp="1" noRot="1" noChangeAspect="1"/>
+          </p:cNvSpPr>
+          <p:nvPr>
+            <p:ph type="sldImg"/>
+          </p:nvPr>
+        </p:nvSpPr>
+        <p:spPr/>
+      </p:sp>
+      <p:sp>
+        <p:nvSpPr>
+          <p:cNvPr id="3" name="Notizenplatzhalter 2"/>
+          <p:cNvSpPr>
+            <a:spLocks noGrp="1"/>
+          </p:cNvSpPr>
+          <p:nvPr>
+            <p:ph type="body" idx="1"/>
+          </p:nvPr>
+        </p:nvSpPr>
+        <p:spPr/>
+        <p:txBody>
+          <a:bodyPr/>
+          <a:lstStyle/>
+          <a:p>
+            <a:endParaRPr lang="de-DE"/>
+          </a:p>
+        </p:txBody>
+      </p:sp>
+      <p:sp>
+        <p:nvSpPr>
+          <p:cNvPr id="4" name="Foliennummernplatzhalter 3"/>
+          <p:cNvSpPr>
+            <a:spLocks noGrp="1"/>
+          </p:cNvSpPr>
+          <p:nvPr>
+            <p:ph type="sldNum" sz="quarter" idx="10"/>
+          </p:nvPr>
+        </p:nvSpPr>
+        <p:spPr/>
+        <p:txBody>
+          <a:bodyPr/>
+          <a:lstStyle/>
+          <a:p>
+            <a:fld id="{446AC1AA-0751-8243-836D-342D444A6997}" type="slidenum">
+              <a:rPr lang="de-DE" smtClean="0"/>
+              <a:pPr/>
+              <a:t>18</a:t>
+            </a:fld>
+            <a:endParaRPr lang="de-DE"/>
+          </a:p>
+        </p:txBody>
+      </p:sp>
+    </p:spTree>
+    <p:extLst>
+      <p:ext uri="{BB962C8B-B14F-4D97-AF65-F5344CB8AC3E}">
+        <p14:creationId xmlns:p14="http://schemas.microsoft.com/office/powerpoint/2010/main" val="50904158"/>
+      </p:ext>
+    </p:extLst>
+  </p:cSld>
+  <p:clrMapOvr>
+    <a:masterClrMapping/>
+  </p:clrMapOvr>
+</p:notes>
+</file>
+
+<file path=ppt/notesSlides/notesSlide19.xml><?xml version="1.0" encoding="utf-8"?>
+<p:notes xmlns:a="http://schemas.openxmlformats.org/drawingml/2006/main" xmlns:r="http://schemas.openxmlformats.org/officeDocument/2006/relationships" xmlns:p="http://schemas.openxmlformats.org/presentationml/2006/main">
+  <p:cSld>
+    <p:spTree>
+      <p:nvGrpSpPr>
+        <p:cNvPr id="1" name=""/>
+        <p:cNvGrpSpPr/>
+        <p:nvPr/>
+      </p:nvGrpSpPr>
+      <p:grpSpPr>
+        <a:xfrm>
+          <a:off x="0" y="0"/>
+          <a:ext cx="0" cy="0"/>
+          <a:chOff x="0" y="0"/>
+          <a:chExt cx="0" cy="0"/>
+        </a:xfrm>
+      </p:grpSpPr>
+      <p:sp>
+        <p:nvSpPr>
+          <p:cNvPr id="2" name="Folienbildplatzhalter 1"/>
+          <p:cNvSpPr>
+            <a:spLocks noGrp="1" noRot="1" noChangeAspect="1"/>
+          </p:cNvSpPr>
+          <p:nvPr>
+            <p:ph type="sldImg"/>
+          </p:nvPr>
+        </p:nvSpPr>
+        <p:spPr/>
+      </p:sp>
+      <p:sp>
+        <p:nvSpPr>
+          <p:cNvPr id="3" name="Notizenplatzhalter 2"/>
+          <p:cNvSpPr>
+            <a:spLocks noGrp="1"/>
+          </p:cNvSpPr>
+          <p:nvPr>
+            <p:ph type="body" idx="1"/>
+          </p:nvPr>
+        </p:nvSpPr>
+        <p:spPr/>
+        <p:txBody>
+          <a:bodyPr/>
+          <a:lstStyle/>
+          <a:p>
+            <a:endParaRPr lang="de-DE"/>
+          </a:p>
+        </p:txBody>
+      </p:sp>
+      <p:sp>
+        <p:nvSpPr>
+          <p:cNvPr id="4" name="Foliennummernplatzhalter 3"/>
+          <p:cNvSpPr>
+            <a:spLocks noGrp="1"/>
+          </p:cNvSpPr>
+          <p:nvPr>
+            <p:ph type="sldNum" sz="quarter" idx="10"/>
+          </p:nvPr>
+        </p:nvSpPr>
+        <p:spPr/>
+        <p:txBody>
+          <a:bodyPr/>
+          <a:lstStyle/>
+          <a:p>
+            <a:fld id="{446AC1AA-0751-8243-836D-342D444A6997}" type="slidenum">
+              <a:rPr lang="de-DE" smtClean="0"/>
+              <a:pPr/>
+              <a:t>19</a:t>
+            </a:fld>
+            <a:endParaRPr lang="de-DE"/>
+          </a:p>
+        </p:txBody>
+      </p:sp>
+    </p:spTree>
+    <p:extLst>
+      <p:ext uri="{BB962C8B-B14F-4D97-AF65-F5344CB8AC3E}">
+        <p14:creationId xmlns:p14="http://schemas.microsoft.com/office/powerpoint/2010/main" val="2404286141"/>
       </p:ext>
     </p:extLst>
   </p:cSld>
@@ -805,11 +1649,7 @@
           <a:bodyPr/>
           <a:lstStyle/>
           <a:p>
-            <a:r>
-              <a:rPr lang="de-DE" dirty="0" smtClean="0"/>
-              <a:t>RENE</a:t>
-            </a:r>
-            <a:endParaRPr lang="de-DE" dirty="0"/>
+            <a:endParaRPr lang="de-DE"/>
           </a:p>
         </p:txBody>
       </p:sp>
@@ -828,10 +1668,10 @@
           <a:bodyPr/>
           <a:lstStyle/>
           <a:p>
-            <a:fld id="{D86164CF-F871-3D47-A661-2FEA5BB7AC1F}" type="slidenum">
+            <a:fld id="{446AC1AA-0751-8243-836D-342D444A6997}" type="slidenum">
               <a:rPr lang="de-DE" smtClean="0"/>
               <a:pPr/>
-              <a:t>4</a:t>
+              <a:t>2</a:t>
             </a:fld>
             <a:endParaRPr lang="de-DE"/>
           </a:p>
@@ -840,7 +1680,347 @@
     </p:spTree>
     <p:extLst>
       <p:ext uri="{BB962C8B-B14F-4D97-AF65-F5344CB8AC3E}">
-        <p14:creationId xmlns:p14="http://schemas.microsoft.com/office/powerpoint/2010/main" val="3749290873"/>
+        <p14:creationId xmlns:p14="http://schemas.microsoft.com/office/powerpoint/2010/main" val="1600971513"/>
+      </p:ext>
+    </p:extLst>
+  </p:cSld>
+  <p:clrMapOvr>
+    <a:masterClrMapping/>
+  </p:clrMapOvr>
+</p:notes>
+</file>
+
+<file path=ppt/notesSlides/notesSlide20.xml><?xml version="1.0" encoding="utf-8"?>
+<p:notes xmlns:a="http://schemas.openxmlformats.org/drawingml/2006/main" xmlns:r="http://schemas.openxmlformats.org/officeDocument/2006/relationships" xmlns:p="http://schemas.openxmlformats.org/presentationml/2006/main">
+  <p:cSld>
+    <p:spTree>
+      <p:nvGrpSpPr>
+        <p:cNvPr id="1" name=""/>
+        <p:cNvGrpSpPr/>
+        <p:nvPr/>
+      </p:nvGrpSpPr>
+      <p:grpSpPr>
+        <a:xfrm>
+          <a:off x="0" y="0"/>
+          <a:ext cx="0" cy="0"/>
+          <a:chOff x="0" y="0"/>
+          <a:chExt cx="0" cy="0"/>
+        </a:xfrm>
+      </p:grpSpPr>
+      <p:sp>
+        <p:nvSpPr>
+          <p:cNvPr id="2" name="Folienbildplatzhalter 1"/>
+          <p:cNvSpPr>
+            <a:spLocks noGrp="1" noRot="1" noChangeAspect="1"/>
+          </p:cNvSpPr>
+          <p:nvPr>
+            <p:ph type="sldImg"/>
+          </p:nvPr>
+        </p:nvSpPr>
+        <p:spPr/>
+      </p:sp>
+      <p:sp>
+        <p:nvSpPr>
+          <p:cNvPr id="3" name="Notizenplatzhalter 2"/>
+          <p:cNvSpPr>
+            <a:spLocks noGrp="1"/>
+          </p:cNvSpPr>
+          <p:nvPr>
+            <p:ph type="body" idx="1"/>
+          </p:nvPr>
+        </p:nvSpPr>
+        <p:spPr/>
+        <p:txBody>
+          <a:bodyPr/>
+          <a:lstStyle/>
+          <a:p>
+            <a:endParaRPr lang="de-DE"/>
+          </a:p>
+        </p:txBody>
+      </p:sp>
+      <p:sp>
+        <p:nvSpPr>
+          <p:cNvPr id="4" name="Foliennummernplatzhalter 3"/>
+          <p:cNvSpPr>
+            <a:spLocks noGrp="1"/>
+          </p:cNvSpPr>
+          <p:nvPr>
+            <p:ph type="sldNum" sz="quarter" idx="10"/>
+          </p:nvPr>
+        </p:nvSpPr>
+        <p:spPr/>
+        <p:txBody>
+          <a:bodyPr/>
+          <a:lstStyle/>
+          <a:p>
+            <a:fld id="{446AC1AA-0751-8243-836D-342D444A6997}" type="slidenum">
+              <a:rPr lang="de-DE" smtClean="0"/>
+              <a:pPr/>
+              <a:t>20</a:t>
+            </a:fld>
+            <a:endParaRPr lang="de-DE"/>
+          </a:p>
+        </p:txBody>
+      </p:sp>
+    </p:spTree>
+    <p:extLst>
+      <p:ext uri="{BB962C8B-B14F-4D97-AF65-F5344CB8AC3E}">
+        <p14:creationId xmlns:p14="http://schemas.microsoft.com/office/powerpoint/2010/main" val="4047369405"/>
+      </p:ext>
+    </p:extLst>
+  </p:cSld>
+  <p:clrMapOvr>
+    <a:masterClrMapping/>
+  </p:clrMapOvr>
+</p:notes>
+</file>
+
+<file path=ppt/notesSlides/notesSlide21.xml><?xml version="1.0" encoding="utf-8"?>
+<p:notes xmlns:a="http://schemas.openxmlformats.org/drawingml/2006/main" xmlns:r="http://schemas.openxmlformats.org/officeDocument/2006/relationships" xmlns:p="http://schemas.openxmlformats.org/presentationml/2006/main">
+  <p:cSld>
+    <p:spTree>
+      <p:nvGrpSpPr>
+        <p:cNvPr id="1" name=""/>
+        <p:cNvGrpSpPr/>
+        <p:nvPr/>
+      </p:nvGrpSpPr>
+      <p:grpSpPr>
+        <a:xfrm>
+          <a:off x="0" y="0"/>
+          <a:ext cx="0" cy="0"/>
+          <a:chOff x="0" y="0"/>
+          <a:chExt cx="0" cy="0"/>
+        </a:xfrm>
+      </p:grpSpPr>
+      <p:sp>
+        <p:nvSpPr>
+          <p:cNvPr id="2" name="Folienbildplatzhalter 1"/>
+          <p:cNvSpPr>
+            <a:spLocks noGrp="1" noRot="1" noChangeAspect="1"/>
+          </p:cNvSpPr>
+          <p:nvPr>
+            <p:ph type="sldImg"/>
+          </p:nvPr>
+        </p:nvSpPr>
+        <p:spPr/>
+      </p:sp>
+      <p:sp>
+        <p:nvSpPr>
+          <p:cNvPr id="3" name="Notizenplatzhalter 2"/>
+          <p:cNvSpPr>
+            <a:spLocks noGrp="1"/>
+          </p:cNvSpPr>
+          <p:nvPr>
+            <p:ph type="body" idx="1"/>
+          </p:nvPr>
+        </p:nvSpPr>
+        <p:spPr/>
+        <p:txBody>
+          <a:bodyPr/>
+          <a:lstStyle/>
+          <a:p>
+            <a:endParaRPr lang="de-DE"/>
+          </a:p>
+        </p:txBody>
+      </p:sp>
+      <p:sp>
+        <p:nvSpPr>
+          <p:cNvPr id="4" name="Foliennummernplatzhalter 3"/>
+          <p:cNvSpPr>
+            <a:spLocks noGrp="1"/>
+          </p:cNvSpPr>
+          <p:nvPr>
+            <p:ph type="sldNum" sz="quarter" idx="10"/>
+          </p:nvPr>
+        </p:nvSpPr>
+        <p:spPr/>
+        <p:txBody>
+          <a:bodyPr/>
+          <a:lstStyle/>
+          <a:p>
+            <a:fld id="{446AC1AA-0751-8243-836D-342D444A6997}" type="slidenum">
+              <a:rPr lang="de-DE" smtClean="0"/>
+              <a:pPr/>
+              <a:t>21</a:t>
+            </a:fld>
+            <a:endParaRPr lang="de-DE"/>
+          </a:p>
+        </p:txBody>
+      </p:sp>
+    </p:spTree>
+    <p:extLst>
+      <p:ext uri="{BB962C8B-B14F-4D97-AF65-F5344CB8AC3E}">
+        <p14:creationId xmlns:p14="http://schemas.microsoft.com/office/powerpoint/2010/main" val="3089942434"/>
+      </p:ext>
+    </p:extLst>
+  </p:cSld>
+  <p:clrMapOvr>
+    <a:masterClrMapping/>
+  </p:clrMapOvr>
+</p:notes>
+</file>
+
+<file path=ppt/notesSlides/notesSlide22.xml><?xml version="1.0" encoding="utf-8"?>
+<p:notes xmlns:a="http://schemas.openxmlformats.org/drawingml/2006/main" xmlns:r="http://schemas.openxmlformats.org/officeDocument/2006/relationships" xmlns:p="http://schemas.openxmlformats.org/presentationml/2006/main">
+  <p:cSld>
+    <p:spTree>
+      <p:nvGrpSpPr>
+        <p:cNvPr id="1" name=""/>
+        <p:cNvGrpSpPr/>
+        <p:nvPr/>
+      </p:nvGrpSpPr>
+      <p:grpSpPr>
+        <a:xfrm>
+          <a:off x="0" y="0"/>
+          <a:ext cx="0" cy="0"/>
+          <a:chOff x="0" y="0"/>
+          <a:chExt cx="0" cy="0"/>
+        </a:xfrm>
+      </p:grpSpPr>
+      <p:sp>
+        <p:nvSpPr>
+          <p:cNvPr id="2" name="Folienbildplatzhalter 1"/>
+          <p:cNvSpPr>
+            <a:spLocks noGrp="1" noRot="1" noChangeAspect="1"/>
+          </p:cNvSpPr>
+          <p:nvPr>
+            <p:ph type="sldImg"/>
+          </p:nvPr>
+        </p:nvSpPr>
+        <p:spPr/>
+      </p:sp>
+      <p:sp>
+        <p:nvSpPr>
+          <p:cNvPr id="3" name="Notizenplatzhalter 2"/>
+          <p:cNvSpPr>
+            <a:spLocks noGrp="1"/>
+          </p:cNvSpPr>
+          <p:nvPr>
+            <p:ph type="body" idx="1"/>
+          </p:nvPr>
+        </p:nvSpPr>
+        <p:spPr/>
+        <p:txBody>
+          <a:bodyPr/>
+          <a:lstStyle/>
+          <a:p>
+            <a:endParaRPr lang="de-DE"/>
+          </a:p>
+        </p:txBody>
+      </p:sp>
+      <p:sp>
+        <p:nvSpPr>
+          <p:cNvPr id="4" name="Foliennummernplatzhalter 3"/>
+          <p:cNvSpPr>
+            <a:spLocks noGrp="1"/>
+          </p:cNvSpPr>
+          <p:nvPr>
+            <p:ph type="sldNum" sz="quarter" idx="10"/>
+          </p:nvPr>
+        </p:nvSpPr>
+        <p:spPr/>
+        <p:txBody>
+          <a:bodyPr/>
+          <a:lstStyle/>
+          <a:p>
+            <a:fld id="{446AC1AA-0751-8243-836D-342D444A6997}" type="slidenum">
+              <a:rPr lang="de-DE" smtClean="0"/>
+              <a:pPr/>
+              <a:t>22</a:t>
+            </a:fld>
+            <a:endParaRPr lang="de-DE"/>
+          </a:p>
+        </p:txBody>
+      </p:sp>
+    </p:spTree>
+    <p:extLst>
+      <p:ext uri="{BB962C8B-B14F-4D97-AF65-F5344CB8AC3E}">
+        <p14:creationId xmlns:p14="http://schemas.microsoft.com/office/powerpoint/2010/main" val="27834752"/>
+      </p:ext>
+    </p:extLst>
+  </p:cSld>
+  <p:clrMapOvr>
+    <a:masterClrMapping/>
+  </p:clrMapOvr>
+</p:notes>
+</file>
+
+<file path=ppt/notesSlides/notesSlide23.xml><?xml version="1.0" encoding="utf-8"?>
+<p:notes xmlns:a="http://schemas.openxmlformats.org/drawingml/2006/main" xmlns:r="http://schemas.openxmlformats.org/officeDocument/2006/relationships" xmlns:p="http://schemas.openxmlformats.org/presentationml/2006/main">
+  <p:cSld>
+    <p:spTree>
+      <p:nvGrpSpPr>
+        <p:cNvPr id="1" name=""/>
+        <p:cNvGrpSpPr/>
+        <p:nvPr/>
+      </p:nvGrpSpPr>
+      <p:grpSpPr>
+        <a:xfrm>
+          <a:off x="0" y="0"/>
+          <a:ext cx="0" cy="0"/>
+          <a:chOff x="0" y="0"/>
+          <a:chExt cx="0" cy="0"/>
+        </a:xfrm>
+      </p:grpSpPr>
+      <p:sp>
+        <p:nvSpPr>
+          <p:cNvPr id="2" name="Folienbildplatzhalter 1"/>
+          <p:cNvSpPr>
+            <a:spLocks noGrp="1" noRot="1" noChangeAspect="1"/>
+          </p:cNvSpPr>
+          <p:nvPr>
+            <p:ph type="sldImg"/>
+          </p:nvPr>
+        </p:nvSpPr>
+        <p:spPr/>
+      </p:sp>
+      <p:sp>
+        <p:nvSpPr>
+          <p:cNvPr id="3" name="Notizenplatzhalter 2"/>
+          <p:cNvSpPr>
+            <a:spLocks noGrp="1"/>
+          </p:cNvSpPr>
+          <p:nvPr>
+            <p:ph type="body" idx="1"/>
+          </p:nvPr>
+        </p:nvSpPr>
+        <p:spPr/>
+        <p:txBody>
+          <a:bodyPr/>
+          <a:lstStyle/>
+          <a:p>
+            <a:endParaRPr lang="de-DE"/>
+          </a:p>
+        </p:txBody>
+      </p:sp>
+      <p:sp>
+        <p:nvSpPr>
+          <p:cNvPr id="4" name="Foliennummernplatzhalter 3"/>
+          <p:cNvSpPr>
+            <a:spLocks noGrp="1"/>
+          </p:cNvSpPr>
+          <p:nvPr>
+            <p:ph type="sldNum" sz="quarter" idx="10"/>
+          </p:nvPr>
+        </p:nvSpPr>
+        <p:spPr/>
+        <p:txBody>
+          <a:bodyPr/>
+          <a:lstStyle/>
+          <a:p>
+            <a:fld id="{446AC1AA-0751-8243-836D-342D444A6997}" type="slidenum">
+              <a:rPr lang="de-DE" smtClean="0"/>
+              <a:pPr/>
+              <a:t>23</a:t>
+            </a:fld>
+            <a:endParaRPr lang="de-DE"/>
+          </a:p>
+        </p:txBody>
+      </p:sp>
+    </p:spTree>
+    <p:extLst>
+      <p:ext uri="{BB962C8B-B14F-4D97-AF65-F5344CB8AC3E}">
+        <p14:creationId xmlns:p14="http://schemas.microsoft.com/office/powerpoint/2010/main" val="1195052172"/>
       </p:ext>
     </p:extLst>
   </p:cSld>
@@ -881,12 +2061,12 @@
       </p:sp>
       <p:sp>
         <p:nvSpPr>
-          <p:cNvPr id="3" name="Notizenplatzhalter 2"/>
+          <p:cNvPr id="4" name="Foliennummernplatzhalter 3"/>
           <p:cNvSpPr>
             <a:spLocks noGrp="1"/>
           </p:cNvSpPr>
           <p:nvPr>
-            <p:ph type="body" idx="1"/>
+            <p:ph type="sldNum" sz="quarter" idx="10"/>
           </p:nvPr>
         </p:nvSpPr>
         <p:spPr/>
@@ -894,13 +2074,160 @@
           <a:bodyPr/>
           <a:lstStyle/>
           <a:p>
-            <a:r>
-              <a:rPr lang="de-DE" dirty="0" smtClean="0"/>
-              <a:t>RENE</a:t>
-            </a:r>
-            <a:endParaRPr lang="de-DE" dirty="0"/>
-          </a:p>
-        </p:txBody>
+            <a:fld id="{D86164CF-F871-3D47-A661-2FEA5BB7AC1F}" type="slidenum">
+              <a:rPr lang="de-DE" smtClean="0"/>
+              <a:pPr/>
+              <a:t>3</a:t>
+            </a:fld>
+            <a:endParaRPr lang="de-DE"/>
+          </a:p>
+        </p:txBody>
+      </p:sp>
+      <p:sp>
+        <p:nvSpPr>
+          <p:cNvPr id="5" name="Notizenplatzhalter 4"/>
+          <p:cNvSpPr>
+            <a:spLocks noGrp="1"/>
+          </p:cNvSpPr>
+          <p:nvPr>
+            <p:ph type="body" sz="quarter" idx="11"/>
+          </p:nvPr>
+        </p:nvSpPr>
+        <p:spPr/>
+        <p:txBody>
+          <a:bodyPr/>
+          <a:lstStyle/>
+          <a:p>
+            <a:endParaRPr lang="de-DE"/>
+          </a:p>
+        </p:txBody>
+      </p:sp>
+    </p:spTree>
+    <p:extLst>
+      <p:ext uri="{BB962C8B-B14F-4D97-AF65-F5344CB8AC3E}">
+        <p14:creationId xmlns:p14="http://schemas.microsoft.com/office/powerpoint/2010/main" val="3749290873"/>
+      </p:ext>
+    </p:extLst>
+  </p:cSld>
+  <p:clrMapOvr>
+    <a:masterClrMapping/>
+  </p:clrMapOvr>
+</p:notes>
+</file>
+
+<file path=ppt/notesSlides/notesSlide4.xml><?xml version="1.0" encoding="utf-8"?>
+<p:notes xmlns:a="http://schemas.openxmlformats.org/drawingml/2006/main" xmlns:r="http://schemas.openxmlformats.org/officeDocument/2006/relationships" xmlns:p="http://schemas.openxmlformats.org/presentationml/2006/main">
+  <p:cSld>
+    <p:spTree>
+      <p:nvGrpSpPr>
+        <p:cNvPr id="1" name=""/>
+        <p:cNvGrpSpPr/>
+        <p:nvPr/>
+      </p:nvGrpSpPr>
+      <p:grpSpPr>
+        <a:xfrm>
+          <a:off x="0" y="0"/>
+          <a:ext cx="0" cy="0"/>
+          <a:chOff x="0" y="0"/>
+          <a:chExt cx="0" cy="0"/>
+        </a:xfrm>
+      </p:grpSpPr>
+      <p:sp>
+        <p:nvSpPr>
+          <p:cNvPr id="2" name="Folienbildplatzhalter 1"/>
+          <p:cNvSpPr>
+            <a:spLocks noGrp="1" noRot="1" noChangeAspect="1"/>
+          </p:cNvSpPr>
+          <p:nvPr>
+            <p:ph type="sldImg"/>
+          </p:nvPr>
+        </p:nvSpPr>
+        <p:spPr/>
+      </p:sp>
+      <p:sp>
+        <p:nvSpPr>
+          <p:cNvPr id="4" name="Foliennummernplatzhalter 3"/>
+          <p:cNvSpPr>
+            <a:spLocks noGrp="1"/>
+          </p:cNvSpPr>
+          <p:nvPr>
+            <p:ph type="sldNum" sz="quarter" idx="10"/>
+          </p:nvPr>
+        </p:nvSpPr>
+        <p:spPr/>
+        <p:txBody>
+          <a:bodyPr/>
+          <a:lstStyle/>
+          <a:p>
+            <a:fld id="{D86164CF-F871-3D47-A661-2FEA5BB7AC1F}" type="slidenum">
+              <a:rPr lang="de-DE" smtClean="0"/>
+              <a:pPr/>
+              <a:t>4</a:t>
+            </a:fld>
+            <a:endParaRPr lang="de-DE"/>
+          </a:p>
+        </p:txBody>
+      </p:sp>
+      <p:sp>
+        <p:nvSpPr>
+          <p:cNvPr id="5" name="Notizenplatzhalter 4"/>
+          <p:cNvSpPr>
+            <a:spLocks noGrp="1"/>
+          </p:cNvSpPr>
+          <p:nvPr>
+            <p:ph type="body" sz="quarter" idx="11"/>
+          </p:nvPr>
+        </p:nvSpPr>
+        <p:spPr/>
+        <p:txBody>
+          <a:bodyPr/>
+          <a:lstStyle/>
+          <a:p>
+            <a:endParaRPr lang="de-DE"/>
+          </a:p>
+        </p:txBody>
+      </p:sp>
+    </p:spTree>
+    <p:extLst>
+      <p:ext uri="{BB962C8B-B14F-4D97-AF65-F5344CB8AC3E}">
+        <p14:creationId xmlns:p14="http://schemas.microsoft.com/office/powerpoint/2010/main" val="3749290873"/>
+      </p:ext>
+    </p:extLst>
+  </p:cSld>
+  <p:clrMapOvr>
+    <a:masterClrMapping/>
+  </p:clrMapOvr>
+</p:notes>
+</file>
+
+<file path=ppt/notesSlides/notesSlide5.xml><?xml version="1.0" encoding="utf-8"?>
+<p:notes xmlns:a="http://schemas.openxmlformats.org/drawingml/2006/main" xmlns:r="http://schemas.openxmlformats.org/officeDocument/2006/relationships" xmlns:p="http://schemas.openxmlformats.org/presentationml/2006/main">
+  <p:cSld>
+    <p:spTree>
+      <p:nvGrpSpPr>
+        <p:cNvPr id="1" name=""/>
+        <p:cNvGrpSpPr/>
+        <p:nvPr/>
+      </p:nvGrpSpPr>
+      <p:grpSpPr>
+        <a:xfrm>
+          <a:off x="0" y="0"/>
+          <a:ext cx="0" cy="0"/>
+          <a:chOff x="0" y="0"/>
+          <a:chExt cx="0" cy="0"/>
+        </a:xfrm>
+      </p:grpSpPr>
+      <p:sp>
+        <p:nvSpPr>
+          <p:cNvPr id="2" name="Folienbildplatzhalter 1"/>
+          <p:cNvSpPr>
+            <a:spLocks noGrp="1" noRot="1" noChangeAspect="1"/>
+          </p:cNvSpPr>
+          <p:nvPr>
+            <p:ph type="sldImg"/>
+          </p:nvPr>
+        </p:nvSpPr>
+        <p:spPr/>
       </p:sp>
       <p:sp>
         <p:nvSpPr>
@@ -926,10 +2253,369 @@
           </a:p>
         </p:txBody>
       </p:sp>
+      <p:sp>
+        <p:nvSpPr>
+          <p:cNvPr id="5" name="Notizenplatzhalter 4"/>
+          <p:cNvSpPr>
+            <a:spLocks noGrp="1"/>
+          </p:cNvSpPr>
+          <p:nvPr>
+            <p:ph type="body" sz="quarter" idx="11"/>
+          </p:nvPr>
+        </p:nvSpPr>
+        <p:spPr/>
+        <p:txBody>
+          <a:bodyPr/>
+          <a:lstStyle/>
+          <a:p>
+            <a:endParaRPr lang="de-DE"/>
+          </a:p>
+        </p:txBody>
+      </p:sp>
     </p:spTree>
     <p:extLst>
       <p:ext uri="{BB962C8B-B14F-4D97-AF65-F5344CB8AC3E}">
         <p14:creationId xmlns:p14="http://schemas.microsoft.com/office/powerpoint/2010/main" val="3749290873"/>
+      </p:ext>
+    </p:extLst>
+  </p:cSld>
+  <p:clrMapOvr>
+    <a:masterClrMapping/>
+  </p:clrMapOvr>
+</p:notes>
+</file>
+
+<file path=ppt/notesSlides/notesSlide6.xml><?xml version="1.0" encoding="utf-8"?>
+<p:notes xmlns:a="http://schemas.openxmlformats.org/drawingml/2006/main" xmlns:r="http://schemas.openxmlformats.org/officeDocument/2006/relationships" xmlns:p="http://schemas.openxmlformats.org/presentationml/2006/main">
+  <p:cSld>
+    <p:spTree>
+      <p:nvGrpSpPr>
+        <p:cNvPr id="1" name=""/>
+        <p:cNvGrpSpPr/>
+        <p:nvPr/>
+      </p:nvGrpSpPr>
+      <p:grpSpPr>
+        <a:xfrm>
+          <a:off x="0" y="0"/>
+          <a:ext cx="0" cy="0"/>
+          <a:chOff x="0" y="0"/>
+          <a:chExt cx="0" cy="0"/>
+        </a:xfrm>
+      </p:grpSpPr>
+      <p:sp>
+        <p:nvSpPr>
+          <p:cNvPr id="2" name="Folienbildplatzhalter 1"/>
+          <p:cNvSpPr>
+            <a:spLocks noGrp="1" noRot="1" noChangeAspect="1"/>
+          </p:cNvSpPr>
+          <p:nvPr>
+            <p:ph type="sldImg"/>
+          </p:nvPr>
+        </p:nvSpPr>
+        <p:spPr/>
+      </p:sp>
+      <p:sp>
+        <p:nvSpPr>
+          <p:cNvPr id="3" name="Notizenplatzhalter 2"/>
+          <p:cNvSpPr>
+            <a:spLocks noGrp="1"/>
+          </p:cNvSpPr>
+          <p:nvPr>
+            <p:ph type="body" idx="1"/>
+          </p:nvPr>
+        </p:nvSpPr>
+        <p:spPr/>
+        <p:txBody>
+          <a:bodyPr/>
+          <a:lstStyle/>
+          <a:p>
+            <a:endParaRPr lang="de-DE"/>
+          </a:p>
+        </p:txBody>
+      </p:sp>
+      <p:sp>
+        <p:nvSpPr>
+          <p:cNvPr id="4" name="Foliennummernplatzhalter 3"/>
+          <p:cNvSpPr>
+            <a:spLocks noGrp="1"/>
+          </p:cNvSpPr>
+          <p:nvPr>
+            <p:ph type="sldNum" sz="quarter" idx="10"/>
+          </p:nvPr>
+        </p:nvSpPr>
+        <p:spPr/>
+        <p:txBody>
+          <a:bodyPr/>
+          <a:lstStyle/>
+          <a:p>
+            <a:fld id="{446AC1AA-0751-8243-836D-342D444A6997}" type="slidenum">
+              <a:rPr lang="de-DE" smtClean="0"/>
+              <a:pPr/>
+              <a:t>6</a:t>
+            </a:fld>
+            <a:endParaRPr lang="de-DE"/>
+          </a:p>
+        </p:txBody>
+      </p:sp>
+    </p:spTree>
+    <p:extLst>
+      <p:ext uri="{BB962C8B-B14F-4D97-AF65-F5344CB8AC3E}">
+        <p14:creationId xmlns:p14="http://schemas.microsoft.com/office/powerpoint/2010/main" val="4077694333"/>
+      </p:ext>
+    </p:extLst>
+  </p:cSld>
+  <p:clrMapOvr>
+    <a:masterClrMapping/>
+  </p:clrMapOvr>
+</p:notes>
+</file>
+
+<file path=ppt/notesSlides/notesSlide7.xml><?xml version="1.0" encoding="utf-8"?>
+<p:notes xmlns:a="http://schemas.openxmlformats.org/drawingml/2006/main" xmlns:r="http://schemas.openxmlformats.org/officeDocument/2006/relationships" xmlns:p="http://schemas.openxmlformats.org/presentationml/2006/main">
+  <p:cSld>
+    <p:spTree>
+      <p:nvGrpSpPr>
+        <p:cNvPr id="1" name=""/>
+        <p:cNvGrpSpPr/>
+        <p:nvPr/>
+      </p:nvGrpSpPr>
+      <p:grpSpPr>
+        <a:xfrm>
+          <a:off x="0" y="0"/>
+          <a:ext cx="0" cy="0"/>
+          <a:chOff x="0" y="0"/>
+          <a:chExt cx="0" cy="0"/>
+        </a:xfrm>
+      </p:grpSpPr>
+      <p:sp>
+        <p:nvSpPr>
+          <p:cNvPr id="2" name="Folienbildplatzhalter 1"/>
+          <p:cNvSpPr>
+            <a:spLocks noGrp="1" noRot="1" noChangeAspect="1"/>
+          </p:cNvSpPr>
+          <p:nvPr>
+            <p:ph type="sldImg"/>
+          </p:nvPr>
+        </p:nvSpPr>
+        <p:spPr/>
+      </p:sp>
+      <p:sp>
+        <p:nvSpPr>
+          <p:cNvPr id="3" name="Notizenplatzhalter 2"/>
+          <p:cNvSpPr>
+            <a:spLocks noGrp="1"/>
+          </p:cNvSpPr>
+          <p:nvPr>
+            <p:ph type="body" idx="1"/>
+          </p:nvPr>
+        </p:nvSpPr>
+        <p:spPr/>
+        <p:txBody>
+          <a:bodyPr/>
+          <a:lstStyle/>
+          <a:p>
+            <a:endParaRPr lang="de-DE"/>
+          </a:p>
+        </p:txBody>
+      </p:sp>
+      <p:sp>
+        <p:nvSpPr>
+          <p:cNvPr id="4" name="Foliennummernplatzhalter 3"/>
+          <p:cNvSpPr>
+            <a:spLocks noGrp="1"/>
+          </p:cNvSpPr>
+          <p:nvPr>
+            <p:ph type="sldNum" sz="quarter" idx="10"/>
+          </p:nvPr>
+        </p:nvSpPr>
+        <p:spPr/>
+        <p:txBody>
+          <a:bodyPr/>
+          <a:lstStyle/>
+          <a:p>
+            <a:fld id="{446AC1AA-0751-8243-836D-342D444A6997}" type="slidenum">
+              <a:rPr lang="de-DE" smtClean="0"/>
+              <a:pPr/>
+              <a:t>7</a:t>
+            </a:fld>
+            <a:endParaRPr lang="de-DE"/>
+          </a:p>
+        </p:txBody>
+      </p:sp>
+    </p:spTree>
+    <p:extLst>
+      <p:ext uri="{BB962C8B-B14F-4D97-AF65-F5344CB8AC3E}">
+        <p14:creationId xmlns:p14="http://schemas.microsoft.com/office/powerpoint/2010/main" val="3950569783"/>
+      </p:ext>
+    </p:extLst>
+  </p:cSld>
+  <p:clrMapOvr>
+    <a:masterClrMapping/>
+  </p:clrMapOvr>
+</p:notes>
+</file>
+
+<file path=ppt/notesSlides/notesSlide8.xml><?xml version="1.0" encoding="utf-8"?>
+<p:notes xmlns:a="http://schemas.openxmlformats.org/drawingml/2006/main" xmlns:r="http://schemas.openxmlformats.org/officeDocument/2006/relationships" xmlns:p="http://schemas.openxmlformats.org/presentationml/2006/main">
+  <p:cSld>
+    <p:spTree>
+      <p:nvGrpSpPr>
+        <p:cNvPr id="1" name=""/>
+        <p:cNvGrpSpPr/>
+        <p:nvPr/>
+      </p:nvGrpSpPr>
+      <p:grpSpPr>
+        <a:xfrm>
+          <a:off x="0" y="0"/>
+          <a:ext cx="0" cy="0"/>
+          <a:chOff x="0" y="0"/>
+          <a:chExt cx="0" cy="0"/>
+        </a:xfrm>
+      </p:grpSpPr>
+      <p:sp>
+        <p:nvSpPr>
+          <p:cNvPr id="2" name="Folienbildplatzhalter 1"/>
+          <p:cNvSpPr>
+            <a:spLocks noGrp="1" noRot="1" noChangeAspect="1"/>
+          </p:cNvSpPr>
+          <p:nvPr>
+            <p:ph type="sldImg"/>
+          </p:nvPr>
+        </p:nvSpPr>
+        <p:spPr/>
+      </p:sp>
+      <p:sp>
+        <p:nvSpPr>
+          <p:cNvPr id="3" name="Notizenplatzhalter 2"/>
+          <p:cNvSpPr>
+            <a:spLocks noGrp="1"/>
+          </p:cNvSpPr>
+          <p:nvPr>
+            <p:ph type="body" idx="1"/>
+          </p:nvPr>
+        </p:nvSpPr>
+        <p:spPr/>
+        <p:txBody>
+          <a:bodyPr/>
+          <a:lstStyle/>
+          <a:p>
+            <a:endParaRPr lang="de-DE"/>
+          </a:p>
+        </p:txBody>
+      </p:sp>
+      <p:sp>
+        <p:nvSpPr>
+          <p:cNvPr id="4" name="Foliennummernplatzhalter 3"/>
+          <p:cNvSpPr>
+            <a:spLocks noGrp="1"/>
+          </p:cNvSpPr>
+          <p:nvPr>
+            <p:ph type="sldNum" sz="quarter" idx="10"/>
+          </p:nvPr>
+        </p:nvSpPr>
+        <p:spPr/>
+        <p:txBody>
+          <a:bodyPr/>
+          <a:lstStyle/>
+          <a:p>
+            <a:fld id="{446AC1AA-0751-8243-836D-342D444A6997}" type="slidenum">
+              <a:rPr lang="de-DE" smtClean="0"/>
+              <a:pPr/>
+              <a:t>8</a:t>
+            </a:fld>
+            <a:endParaRPr lang="de-DE"/>
+          </a:p>
+        </p:txBody>
+      </p:sp>
+    </p:spTree>
+    <p:extLst>
+      <p:ext uri="{BB962C8B-B14F-4D97-AF65-F5344CB8AC3E}">
+        <p14:creationId xmlns:p14="http://schemas.microsoft.com/office/powerpoint/2010/main" val="881681360"/>
+      </p:ext>
+    </p:extLst>
+  </p:cSld>
+  <p:clrMapOvr>
+    <a:masterClrMapping/>
+  </p:clrMapOvr>
+</p:notes>
+</file>
+
+<file path=ppt/notesSlides/notesSlide9.xml><?xml version="1.0" encoding="utf-8"?>
+<p:notes xmlns:a="http://schemas.openxmlformats.org/drawingml/2006/main" xmlns:r="http://schemas.openxmlformats.org/officeDocument/2006/relationships" xmlns:p="http://schemas.openxmlformats.org/presentationml/2006/main">
+  <p:cSld>
+    <p:spTree>
+      <p:nvGrpSpPr>
+        <p:cNvPr id="1" name=""/>
+        <p:cNvGrpSpPr/>
+        <p:nvPr/>
+      </p:nvGrpSpPr>
+      <p:grpSpPr>
+        <a:xfrm>
+          <a:off x="0" y="0"/>
+          <a:ext cx="0" cy="0"/>
+          <a:chOff x="0" y="0"/>
+          <a:chExt cx="0" cy="0"/>
+        </a:xfrm>
+      </p:grpSpPr>
+      <p:sp>
+        <p:nvSpPr>
+          <p:cNvPr id="2" name="Folienbildplatzhalter 1"/>
+          <p:cNvSpPr>
+            <a:spLocks noGrp="1" noRot="1" noChangeAspect="1"/>
+          </p:cNvSpPr>
+          <p:nvPr>
+            <p:ph type="sldImg"/>
+          </p:nvPr>
+        </p:nvSpPr>
+        <p:spPr/>
+      </p:sp>
+      <p:sp>
+        <p:nvSpPr>
+          <p:cNvPr id="3" name="Notizenplatzhalter 2"/>
+          <p:cNvSpPr>
+            <a:spLocks noGrp="1"/>
+          </p:cNvSpPr>
+          <p:nvPr>
+            <p:ph type="body" idx="1"/>
+          </p:nvPr>
+        </p:nvSpPr>
+        <p:spPr/>
+        <p:txBody>
+          <a:bodyPr/>
+          <a:lstStyle/>
+          <a:p>
+            <a:endParaRPr lang="de-DE"/>
+          </a:p>
+        </p:txBody>
+      </p:sp>
+      <p:sp>
+        <p:nvSpPr>
+          <p:cNvPr id="4" name="Foliennummernplatzhalter 3"/>
+          <p:cNvSpPr>
+            <a:spLocks noGrp="1"/>
+          </p:cNvSpPr>
+          <p:nvPr>
+            <p:ph type="sldNum" sz="quarter" idx="10"/>
+          </p:nvPr>
+        </p:nvSpPr>
+        <p:spPr/>
+        <p:txBody>
+          <a:bodyPr/>
+          <a:lstStyle/>
+          <a:p>
+            <a:fld id="{446AC1AA-0751-8243-836D-342D444A6997}" type="slidenum">
+              <a:rPr lang="de-DE" smtClean="0"/>
+              <a:pPr/>
+              <a:t>9</a:t>
+            </a:fld>
+            <a:endParaRPr lang="de-DE"/>
+          </a:p>
+        </p:txBody>
+      </p:sp>
+    </p:spTree>
+    <p:extLst>
+      <p:ext uri="{BB962C8B-B14F-4D97-AF65-F5344CB8AC3E}">
+        <p14:creationId xmlns:p14="http://schemas.microsoft.com/office/powerpoint/2010/main" val="1214753716"/>
       </p:ext>
     </p:extLst>
   </p:cSld>
@@ -3199,7 +4885,7 @@
           <p:nvPr/>
         </p:nvPicPr>
         <p:blipFill>
-          <a:blip r:embed="rId2"/>
+          <a:blip r:embed="rId3"/>
           <a:stretch>
             <a:fillRect/>
           </a:stretch>
@@ -3760,7 +5446,7 @@
           <p:nvPr/>
         </p:nvPicPr>
         <p:blipFill>
-          <a:blip r:embed="rId2"/>
+          <a:blip r:embed="rId3"/>
           <a:stretch>
             <a:fillRect/>
           </a:stretch>
@@ -4178,7 +5864,7 @@
           <p:nvPr/>
         </p:nvPicPr>
         <p:blipFill>
-          <a:blip r:embed="rId2"/>
+          <a:blip r:embed="rId3"/>
           <a:stretch>
             <a:fillRect/>
           </a:stretch>
@@ -4349,149 +6035,6 @@
         <p:spPr>
           <a:xfrm>
             <a:off x="315884" y="1041400"/>
-            <a:ext cx="8497916" cy="5339928"/>
-          </a:xfrm>
-        </p:spPr>
-        <p:txBody>
-          <a:bodyPr>
-            <a:normAutofit/>
-          </a:bodyPr>
-          <a:lstStyle/>
-          <a:p>
-            <a:pPr marL="0" indent="0">
-              <a:buNone/>
-            </a:pPr>
-            <a:r>
-              <a:rPr lang="de-DE" sz="2800" b="1" dirty="0" smtClean="0"/>
-              <a:t>„Regular“ </a:t>
-            </a:r>
-            <a:r>
-              <a:rPr lang="de-DE" sz="2800" b="1" dirty="0" err="1" smtClean="0"/>
-              <a:t>React</a:t>
-            </a:r>
-            <a:r>
-              <a:rPr lang="de-DE" sz="2800" b="1" dirty="0" smtClean="0"/>
-              <a:t> </a:t>
-            </a:r>
-            <a:r>
-              <a:rPr lang="de-DE" sz="2800" b="1" dirty="0" err="1" smtClean="0"/>
-              <a:t>component</a:t>
-            </a:r>
-            <a:endParaRPr lang="de-DE" sz="2800" b="1" dirty="0" smtClean="0"/>
-          </a:p>
-          <a:p>
-            <a:r>
-              <a:rPr lang="de-DE" sz="2800" dirty="0" smtClean="0"/>
-              <a:t>Triggers an </a:t>
-            </a:r>
-            <a:r>
-              <a:rPr lang="de-DE" sz="2800" dirty="0" err="1" smtClean="0"/>
-              <a:t>action</a:t>
-            </a:r>
-            <a:r>
-              <a:rPr lang="de-DE" sz="2800" dirty="0" smtClean="0"/>
-              <a:t>, e.g. on </a:t>
-            </a:r>
-            <a:r>
-              <a:rPr lang="de-DE" sz="2800" dirty="0" err="1" smtClean="0"/>
-              <a:t>user</a:t>
-            </a:r>
-            <a:r>
-              <a:rPr lang="de-DE" sz="2800" dirty="0" smtClean="0"/>
-              <a:t> </a:t>
-            </a:r>
-            <a:r>
-              <a:rPr lang="de-DE" sz="2800" dirty="0" err="1" smtClean="0"/>
-              <a:t>interaction</a:t>
-            </a:r>
-            <a:r>
-              <a:rPr lang="de-DE" sz="2800" dirty="0" smtClean="0"/>
-              <a:t> </a:t>
-            </a:r>
-          </a:p>
-          <a:p>
-            <a:pPr marL="0" indent="0">
-              <a:buNone/>
-            </a:pPr>
-            <a:endParaRPr lang="de-DE" dirty="0" smtClean="0"/>
-          </a:p>
-        </p:txBody>
-      </p:sp>
-      <p:sp>
-        <p:nvSpPr>
-          <p:cNvPr id="3" name="Titel 2"/>
-          <p:cNvSpPr>
-            <a:spLocks noGrp="1"/>
-          </p:cNvSpPr>
-          <p:nvPr>
-            <p:ph type="title"/>
-          </p:nvPr>
-        </p:nvSpPr>
-        <p:spPr/>
-        <p:txBody>
-          <a:bodyPr>
-            <a:normAutofit fontScale="90000"/>
-          </a:bodyPr>
-          <a:lstStyle/>
-          <a:p>
-            <a:r>
-              <a:rPr lang="de-DE" dirty="0" smtClean="0"/>
-              <a:t>COMPONENT</a:t>
-            </a:r>
-            <a:endParaRPr lang="de-DE" dirty="0"/>
-          </a:p>
-        </p:txBody>
-      </p:sp>
-    </p:spTree>
-    <p:extLst>
-      <p:ext uri="{BB962C8B-B14F-4D97-AF65-F5344CB8AC3E}">
-        <p14:creationId xmlns:p14="http://schemas.microsoft.com/office/powerpoint/2010/main" val="3091869641"/>
-      </p:ext>
-    </p:extLst>
-  </p:cSld>
-  <p:clrMapOvr>
-    <a:masterClrMapping/>
-  </p:clrMapOvr>
-  <p:timing>
-    <p:tnLst>
-      <p:par>
-        <p:cTn xmlns:p14="http://schemas.microsoft.com/office/powerpoint/2010/main" id="1" dur="indefinite" restart="never" nodeType="tmRoot"/>
-      </p:par>
-    </p:tnLst>
-  </p:timing>
-</p:sld>
-</file>
-
-<file path=ppt/slides/slide15.xml><?xml version="1.0" encoding="utf-8"?>
-<p:sld xmlns:a="http://schemas.openxmlformats.org/drawingml/2006/main" xmlns:r="http://schemas.openxmlformats.org/officeDocument/2006/relationships" xmlns:p="http://schemas.openxmlformats.org/presentationml/2006/main">
-  <p:cSld>
-    <p:spTree>
-      <p:nvGrpSpPr>
-        <p:cNvPr id="1" name=""/>
-        <p:cNvGrpSpPr/>
-        <p:nvPr/>
-      </p:nvGrpSpPr>
-      <p:grpSpPr>
-        <a:xfrm>
-          <a:off x="0" y="0"/>
-          <a:ext cx="0" cy="0"/>
-          <a:chOff x="0" y="0"/>
-          <a:chExt cx="0" cy="0"/>
-        </a:xfrm>
-      </p:grpSpPr>
-      <p:sp>
-        <p:nvSpPr>
-          <p:cNvPr id="2" name="Inhaltsplatzhalter 1"/>
-          <p:cNvSpPr>
-            <a:spLocks noGrp="1"/>
-          </p:cNvSpPr>
-          <p:nvPr>
-            <p:ph idx="1"/>
-          </p:nvPr>
-        </p:nvSpPr>
-        <p:spPr>
-          <a:xfrm>
-            <a:off x="315884" y="1041400"/>
             <a:ext cx="5348316" cy="5339928"/>
           </a:xfrm>
         </p:spPr>
@@ -4537,11 +6080,7 @@
             <a:pPr lvl="1"/>
             <a:r>
               <a:rPr lang="de-DE" sz="2400" dirty="0" smtClean="0"/>
-              <a:t>e.g</a:t>
-            </a:r>
-            <a:r>
-              <a:rPr lang="de-DE" sz="2400" dirty="0" smtClean="0"/>
-              <a:t>. on </a:t>
+              <a:t>e.g. on </a:t>
             </a:r>
             <a:r>
               <a:rPr lang="de-DE" sz="2400" dirty="0" err="1" smtClean="0"/>
@@ -4821,7 +6360,7 @@
           <p:nvPr/>
         </p:nvPicPr>
         <p:blipFill>
-          <a:blip r:embed="rId2"/>
+          <a:blip r:embed="rId3"/>
           <a:stretch>
             <a:fillRect/>
           </a:stretch>
@@ -4856,7 +6395,7 @@
 </p:sld>
 </file>
 
-<file path=ppt/slides/slide16.xml><?xml version="1.0" encoding="utf-8"?>
+<file path=ppt/slides/slide15.xml><?xml version="1.0" encoding="utf-8"?>
 <p:sld xmlns:a="http://schemas.openxmlformats.org/drawingml/2006/main" xmlns:r="http://schemas.openxmlformats.org/officeDocument/2006/relationships" xmlns:p="http://schemas.openxmlformats.org/presentationml/2006/main">
   <p:cSld>
     <p:spTree>
@@ -4983,11 +6522,7 @@
             </a:r>
             <a:r>
               <a:rPr lang="de-DE" sz="2800" dirty="0" smtClean="0"/>
-              <a:t> </a:t>
-            </a:r>
-            <a:r>
-              <a:rPr lang="de-DE" sz="2800" dirty="0" smtClean="0"/>
-              <a:t>happend (</a:t>
+              <a:t> happend (</a:t>
             </a:r>
             <a:r>
               <a:rPr lang="de-DE" sz="2800" dirty="0" err="1" smtClean="0"/>
@@ -5021,11 +6556,7 @@
             </a:r>
             <a:r>
               <a:rPr lang="de-DE" sz="2800" dirty="0" smtClean="0"/>
-              <a:t>omponents</a:t>
-            </a:r>
-            <a:r>
-              <a:rPr lang="de-DE" sz="2800" dirty="0" smtClean="0"/>
-              <a:t> </a:t>
+              <a:t>omponents </a:t>
             </a:r>
           </a:p>
           <a:p>
@@ -5122,16 +6653,11 @@
               <a:rPr lang="de-DE" sz="2800" dirty="0" smtClean="0"/>
               <a:t> </a:t>
             </a:r>
-            <a:endParaRPr lang="de-DE" sz="2800" dirty="0" smtClean="0"/>
           </a:p>
           <a:p>
             <a:r>
               <a:rPr lang="de-DE" sz="2800" dirty="0" smtClean="0"/>
-              <a:t>Pass </a:t>
-            </a:r>
-            <a:r>
-              <a:rPr lang="de-DE" sz="2800" dirty="0" smtClean="0"/>
-              <a:t>Action </a:t>
+              <a:t>Pass Action </a:t>
             </a:r>
             <a:r>
               <a:rPr lang="de-DE" sz="2800" dirty="0" err="1" smtClean="0"/>
@@ -5197,7 +6723,7 @@
           <p:nvPr/>
         </p:nvPicPr>
         <p:blipFill>
-          <a:blip r:embed="rId2"/>
+          <a:blip r:embed="rId3"/>
           <a:stretch>
             <a:fillRect/>
           </a:stretch>
@@ -5232,7 +6758,7 @@
 </p:sld>
 </file>
 
-<file path=ppt/slides/slide17.xml><?xml version="1.0" encoding="utf-8"?>
+<file path=ppt/slides/slide16.xml><?xml version="1.0" encoding="utf-8"?>
 <p:sld xmlns:a="http://schemas.openxmlformats.org/drawingml/2006/main" xmlns:r="http://schemas.openxmlformats.org/officeDocument/2006/relationships" xmlns:p="http://schemas.openxmlformats.org/presentationml/2006/main">
   <p:cSld>
     <p:spTree>
@@ -5343,11 +6869,7 @@
           <a:p>
             <a:r>
               <a:rPr lang="de-DE" sz="2800" dirty="0" smtClean="0"/>
-              <a:t>Forwards </a:t>
-            </a:r>
-            <a:r>
-              <a:rPr lang="de-DE" sz="2800" dirty="0" smtClean="0"/>
-              <a:t>Actions </a:t>
+              <a:t>Forwards Actions </a:t>
             </a:r>
             <a:r>
               <a:rPr lang="de-DE" sz="2800" dirty="0" err="1" smtClean="0"/>
@@ -5363,11 +6885,7 @@
             </a:r>
             <a:r>
               <a:rPr lang="de-DE" sz="2800" dirty="0" smtClean="0"/>
-              <a:t> </a:t>
-            </a:r>
-            <a:r>
-              <a:rPr lang="de-DE" sz="2800" dirty="0" smtClean="0"/>
-              <a:t>registered Stores</a:t>
+              <a:t> registered Stores</a:t>
             </a:r>
           </a:p>
           <a:p>
@@ -5383,7 +6901,6 @@
               <a:rPr lang="de-DE" sz="2800" dirty="0" smtClean="0"/>
               <a:t>  </a:t>
             </a:r>
-            <a:endParaRPr lang="de-DE" sz="2800" dirty="0" smtClean="0"/>
           </a:p>
           <a:p>
             <a:pPr marL="0" indent="0">
@@ -5427,7 +6944,7 @@
           <p:nvPr/>
         </p:nvPicPr>
         <p:blipFill>
-          <a:blip r:embed="rId2"/>
+          <a:blip r:embed="rId3"/>
           <a:stretch>
             <a:fillRect/>
           </a:stretch>
@@ -5462,7 +6979,7 @@
 </p:sld>
 </file>
 
-<file path=ppt/slides/slide18.xml><?xml version="1.0" encoding="utf-8"?>
+<file path=ppt/slides/slide17.xml><?xml version="1.0" encoding="utf-8"?>
 <p:sld xmlns:a="http://schemas.openxmlformats.org/drawingml/2006/main" xmlns:r="http://schemas.openxmlformats.org/officeDocument/2006/relationships" xmlns:p="http://schemas.openxmlformats.org/presentationml/2006/main">
   <p:cSld>
     <p:spTree>
@@ -5746,7 +7263,7 @@
           <p:nvPr/>
         </p:nvPicPr>
         <p:blipFill>
-          <a:blip r:embed="rId2"/>
+          <a:blip r:embed="rId3"/>
           <a:stretch>
             <a:fillRect/>
           </a:stretch>
@@ -5781,7 +7298,7 @@
 </p:sld>
 </file>
 
-<file path=ppt/slides/slide19.xml><?xml version="1.0" encoding="utf-8"?>
+<file path=ppt/slides/slide18.xml><?xml version="1.0" encoding="utf-8"?>
 <p:sld xmlns:a="http://schemas.openxmlformats.org/drawingml/2006/main" xmlns:r="http://schemas.openxmlformats.org/officeDocument/2006/relationships" xmlns:p="http://schemas.openxmlformats.org/presentationml/2006/main">
   <p:cSld>
     <p:spTree>
@@ -5886,7 +7403,7 @@
           <p:nvPr/>
         </p:nvPicPr>
         <p:blipFill>
-          <a:blip r:embed="rId2"/>
+          <a:blip r:embed="rId3"/>
           <a:stretch>
             <a:fillRect/>
           </a:stretch>
@@ -5905,6 +7422,206 @@
     <p:extLst>
       <p:ext uri="{BB962C8B-B14F-4D97-AF65-F5344CB8AC3E}">
         <p14:creationId xmlns:p14="http://schemas.microsoft.com/office/powerpoint/2010/main" val="2995986788"/>
+      </p:ext>
+    </p:extLst>
+  </p:cSld>
+  <p:clrMapOvr>
+    <a:masterClrMapping/>
+  </p:clrMapOvr>
+  <p:timing>
+    <p:tnLst>
+      <p:par>
+        <p:cTn xmlns:p14="http://schemas.microsoft.com/office/powerpoint/2010/main" id="1" dur="indefinite" restart="never" nodeType="tmRoot"/>
+      </p:par>
+    </p:tnLst>
+  </p:timing>
+</p:sld>
+</file>
+
+<file path=ppt/slides/slide19.xml><?xml version="1.0" encoding="utf-8"?>
+<p:sld xmlns:a="http://schemas.openxmlformats.org/drawingml/2006/main" xmlns:r="http://schemas.openxmlformats.org/officeDocument/2006/relationships" xmlns:p="http://schemas.openxmlformats.org/presentationml/2006/main">
+  <p:cSld>
+    <p:spTree>
+      <p:nvGrpSpPr>
+        <p:cNvPr id="1" name=""/>
+        <p:cNvGrpSpPr/>
+        <p:nvPr/>
+      </p:nvGrpSpPr>
+      <p:grpSpPr>
+        <a:xfrm>
+          <a:off x="0" y="0"/>
+          <a:ext cx="0" cy="0"/>
+          <a:chOff x="0" y="0"/>
+          <a:chExt cx="0" cy="0"/>
+        </a:xfrm>
+      </p:grpSpPr>
+      <p:sp>
+        <p:nvSpPr>
+          <p:cNvPr id="2" name="Inhaltsplatzhalter 1"/>
+          <p:cNvSpPr>
+            <a:spLocks noGrp="1"/>
+          </p:cNvSpPr>
+          <p:nvPr>
+            <p:ph idx="1"/>
+          </p:nvPr>
+        </p:nvSpPr>
+        <p:spPr>
+          <a:xfrm>
+            <a:off x="315884" y="5445224"/>
+            <a:ext cx="8512232" cy="1192643"/>
+          </a:xfrm>
+        </p:spPr>
+        <p:txBody>
+          <a:bodyPr/>
+          <a:lstStyle/>
+          <a:p>
+            <a:pPr marL="0" indent="0">
+              <a:buNone/>
+            </a:pPr>
+            <a:r>
+              <a:rPr lang="de-DE" dirty="0" smtClean="0"/>
+              <a:t>...Action </a:t>
+            </a:r>
+            <a:r>
+              <a:rPr lang="de-DE" dirty="0" err="1" smtClean="0"/>
+              <a:t>can</a:t>
+            </a:r>
+            <a:r>
+              <a:rPr lang="de-DE" dirty="0" smtClean="0"/>
+              <a:t> </a:t>
+            </a:r>
+            <a:r>
+              <a:rPr lang="de-DE" dirty="0" err="1" smtClean="0"/>
+              <a:t>be</a:t>
+            </a:r>
+            <a:r>
+              <a:rPr lang="de-DE" dirty="0" smtClean="0"/>
+              <a:t> </a:t>
+            </a:r>
+            <a:r>
+              <a:rPr lang="de-DE" dirty="0" err="1" smtClean="0"/>
+              <a:t>dispatched</a:t>
+            </a:r>
+            <a:r>
+              <a:rPr lang="de-DE" dirty="0" smtClean="0"/>
+              <a:t> </a:t>
+            </a:r>
+            <a:r>
+              <a:rPr lang="de-DE" dirty="0" err="1" smtClean="0"/>
+              <a:t>to</a:t>
+            </a:r>
+            <a:r>
+              <a:rPr lang="de-DE" dirty="0" smtClean="0"/>
+              <a:t> multiple </a:t>
+            </a:r>
+            <a:r>
+              <a:rPr lang="de-DE" dirty="0" err="1" smtClean="0"/>
+              <a:t>stores</a:t>
+            </a:r>
+            <a:endParaRPr lang="de-DE" dirty="0" smtClean="0"/>
+          </a:p>
+          <a:p>
+            <a:pPr marL="0" indent="0">
+              <a:buNone/>
+            </a:pPr>
+            <a:r>
+              <a:rPr lang="de-DE" dirty="0" smtClean="0"/>
+              <a:t>...A </a:t>
+            </a:r>
+            <a:r>
+              <a:rPr lang="de-DE" dirty="0" err="1" smtClean="0"/>
+              <a:t>component</a:t>
+            </a:r>
+            <a:r>
+              <a:rPr lang="de-DE" dirty="0" smtClean="0"/>
+              <a:t> </a:t>
+            </a:r>
+            <a:r>
+              <a:rPr lang="de-DE" dirty="0" err="1" smtClean="0"/>
+              <a:t>can</a:t>
+            </a:r>
+            <a:r>
+              <a:rPr lang="de-DE" dirty="0" smtClean="0"/>
+              <a:t> listen </a:t>
+            </a:r>
+            <a:r>
+              <a:rPr lang="de-DE" dirty="0" err="1" smtClean="0"/>
+              <a:t>to</a:t>
+            </a:r>
+            <a:r>
+              <a:rPr lang="de-DE" dirty="0" smtClean="0"/>
+              <a:t> multiple </a:t>
+            </a:r>
+            <a:r>
+              <a:rPr lang="de-DE" dirty="0" err="1" smtClean="0"/>
+              <a:t>stores</a:t>
+            </a:r>
+            <a:r>
+              <a:rPr lang="de-DE" dirty="0" smtClean="0"/>
+              <a:t>...</a:t>
+            </a:r>
+          </a:p>
+          <a:p>
+            <a:pPr marL="0" indent="0">
+              <a:buNone/>
+            </a:pPr>
+            <a:endParaRPr lang="de-DE" dirty="0"/>
+          </a:p>
+        </p:txBody>
+      </p:sp>
+      <p:sp>
+        <p:nvSpPr>
+          <p:cNvPr id="3" name="Titel 2"/>
+          <p:cNvSpPr>
+            <a:spLocks noGrp="1"/>
+          </p:cNvSpPr>
+          <p:nvPr>
+            <p:ph type="title"/>
+          </p:nvPr>
+        </p:nvSpPr>
+        <p:spPr/>
+        <p:txBody>
+          <a:bodyPr>
+            <a:normAutofit fontScale="90000"/>
+          </a:bodyPr>
+          <a:lstStyle/>
+          <a:p>
+            <a:r>
+              <a:rPr lang="de-DE" dirty="0" smtClean="0"/>
+              <a:t>UNI-DIRECTIONAL DATA FLOW - EXAMPLE 1</a:t>
+            </a:r>
+            <a:endParaRPr lang="de-DE" dirty="0"/>
+          </a:p>
+        </p:txBody>
+      </p:sp>
+      <p:pic>
+        <p:nvPicPr>
+          <p:cNvPr id="4" name="Bild 3"/>
+          <p:cNvPicPr>
+            <a:picLocks noChangeAspect="1"/>
+          </p:cNvPicPr>
+          <p:nvPr/>
+        </p:nvPicPr>
+        <p:blipFill>
+          <a:blip r:embed="rId3"/>
+          <a:stretch>
+            <a:fillRect/>
+          </a:stretch>
+        </p:blipFill>
+        <p:spPr>
+          <a:xfrm>
+            <a:off x="392322" y="1371600"/>
+            <a:ext cx="8435794" cy="3785592"/>
+          </a:xfrm>
+          <a:prstGeom prst="rect">
+            <a:avLst/>
+          </a:prstGeom>
+        </p:spPr>
+      </p:pic>
+    </p:spTree>
+    <p:extLst>
+      <p:ext uri="{BB962C8B-B14F-4D97-AF65-F5344CB8AC3E}">
+        <p14:creationId xmlns:p14="http://schemas.microsoft.com/office/powerpoint/2010/main" val="2277398810"/>
       </p:ext>
     </p:extLst>
   </p:cSld>
@@ -6499,206 +8216,6 @@
             </a:pPr>
             <a:r>
               <a:rPr lang="de-DE" dirty="0" smtClean="0"/>
-              <a:t>...Action </a:t>
-            </a:r>
-            <a:r>
-              <a:rPr lang="de-DE" dirty="0" err="1" smtClean="0"/>
-              <a:t>can</a:t>
-            </a:r>
-            <a:r>
-              <a:rPr lang="de-DE" dirty="0" smtClean="0"/>
-              <a:t> </a:t>
-            </a:r>
-            <a:r>
-              <a:rPr lang="de-DE" dirty="0" err="1" smtClean="0"/>
-              <a:t>be</a:t>
-            </a:r>
-            <a:r>
-              <a:rPr lang="de-DE" dirty="0" smtClean="0"/>
-              <a:t> </a:t>
-            </a:r>
-            <a:r>
-              <a:rPr lang="de-DE" dirty="0" err="1" smtClean="0"/>
-              <a:t>dispatched</a:t>
-            </a:r>
-            <a:r>
-              <a:rPr lang="de-DE" dirty="0" smtClean="0"/>
-              <a:t> </a:t>
-            </a:r>
-            <a:r>
-              <a:rPr lang="de-DE" dirty="0" err="1" smtClean="0"/>
-              <a:t>to</a:t>
-            </a:r>
-            <a:r>
-              <a:rPr lang="de-DE" dirty="0" smtClean="0"/>
-              <a:t> multiple </a:t>
-            </a:r>
-            <a:r>
-              <a:rPr lang="de-DE" dirty="0" err="1" smtClean="0"/>
-              <a:t>stores</a:t>
-            </a:r>
-            <a:endParaRPr lang="de-DE" dirty="0" smtClean="0"/>
-          </a:p>
-          <a:p>
-            <a:pPr marL="0" indent="0">
-              <a:buNone/>
-            </a:pPr>
-            <a:r>
-              <a:rPr lang="de-DE" dirty="0" smtClean="0"/>
-              <a:t>...A </a:t>
-            </a:r>
-            <a:r>
-              <a:rPr lang="de-DE" dirty="0" err="1" smtClean="0"/>
-              <a:t>component</a:t>
-            </a:r>
-            <a:r>
-              <a:rPr lang="de-DE" dirty="0" smtClean="0"/>
-              <a:t> </a:t>
-            </a:r>
-            <a:r>
-              <a:rPr lang="de-DE" dirty="0" err="1" smtClean="0"/>
-              <a:t>can</a:t>
-            </a:r>
-            <a:r>
-              <a:rPr lang="de-DE" dirty="0" smtClean="0"/>
-              <a:t> listen </a:t>
-            </a:r>
-            <a:r>
-              <a:rPr lang="de-DE" dirty="0" err="1" smtClean="0"/>
-              <a:t>to</a:t>
-            </a:r>
-            <a:r>
-              <a:rPr lang="de-DE" dirty="0" smtClean="0"/>
-              <a:t> multiple </a:t>
-            </a:r>
-            <a:r>
-              <a:rPr lang="de-DE" dirty="0" err="1" smtClean="0"/>
-              <a:t>stores</a:t>
-            </a:r>
-            <a:r>
-              <a:rPr lang="de-DE" dirty="0" smtClean="0"/>
-              <a:t>...</a:t>
-            </a:r>
-          </a:p>
-          <a:p>
-            <a:pPr marL="0" indent="0">
-              <a:buNone/>
-            </a:pPr>
-            <a:endParaRPr lang="de-DE" dirty="0"/>
-          </a:p>
-        </p:txBody>
-      </p:sp>
-      <p:sp>
-        <p:nvSpPr>
-          <p:cNvPr id="3" name="Titel 2"/>
-          <p:cNvSpPr>
-            <a:spLocks noGrp="1"/>
-          </p:cNvSpPr>
-          <p:nvPr>
-            <p:ph type="title"/>
-          </p:nvPr>
-        </p:nvSpPr>
-        <p:spPr/>
-        <p:txBody>
-          <a:bodyPr>
-            <a:normAutofit fontScale="90000"/>
-          </a:bodyPr>
-          <a:lstStyle/>
-          <a:p>
-            <a:r>
-              <a:rPr lang="de-DE" dirty="0" smtClean="0"/>
-              <a:t>UNI-DIRECTIONAL DATA FLOW - EXAMPLE 1</a:t>
-            </a:r>
-            <a:endParaRPr lang="de-DE" dirty="0"/>
-          </a:p>
-        </p:txBody>
-      </p:sp>
-      <p:pic>
-        <p:nvPicPr>
-          <p:cNvPr id="4" name="Bild 3"/>
-          <p:cNvPicPr>
-            <a:picLocks noChangeAspect="1"/>
-          </p:cNvPicPr>
-          <p:nvPr/>
-        </p:nvPicPr>
-        <p:blipFill>
-          <a:blip r:embed="rId2"/>
-          <a:stretch>
-            <a:fillRect/>
-          </a:stretch>
-        </p:blipFill>
-        <p:spPr>
-          <a:xfrm>
-            <a:off x="392322" y="1371600"/>
-            <a:ext cx="8435794" cy="3785592"/>
-          </a:xfrm>
-          <a:prstGeom prst="rect">
-            <a:avLst/>
-          </a:prstGeom>
-        </p:spPr>
-      </p:pic>
-    </p:spTree>
-    <p:extLst>
-      <p:ext uri="{BB962C8B-B14F-4D97-AF65-F5344CB8AC3E}">
-        <p14:creationId xmlns:p14="http://schemas.microsoft.com/office/powerpoint/2010/main" val="2277398810"/>
-      </p:ext>
-    </p:extLst>
-  </p:cSld>
-  <p:clrMapOvr>
-    <a:masterClrMapping/>
-  </p:clrMapOvr>
-  <p:timing>
-    <p:tnLst>
-      <p:par>
-        <p:cTn xmlns:p14="http://schemas.microsoft.com/office/powerpoint/2010/main" id="1" dur="indefinite" restart="never" nodeType="tmRoot"/>
-      </p:par>
-    </p:tnLst>
-  </p:timing>
-</p:sld>
-</file>
-
-<file path=ppt/slides/slide21.xml><?xml version="1.0" encoding="utf-8"?>
-<p:sld xmlns:a="http://schemas.openxmlformats.org/drawingml/2006/main" xmlns:r="http://schemas.openxmlformats.org/officeDocument/2006/relationships" xmlns:p="http://schemas.openxmlformats.org/presentationml/2006/main">
-  <p:cSld>
-    <p:spTree>
-      <p:nvGrpSpPr>
-        <p:cNvPr id="1" name=""/>
-        <p:cNvGrpSpPr/>
-        <p:nvPr/>
-      </p:nvGrpSpPr>
-      <p:grpSpPr>
-        <a:xfrm>
-          <a:off x="0" y="0"/>
-          <a:ext cx="0" cy="0"/>
-          <a:chOff x="0" y="0"/>
-          <a:chExt cx="0" cy="0"/>
-        </a:xfrm>
-      </p:grpSpPr>
-      <p:sp>
-        <p:nvSpPr>
-          <p:cNvPr id="2" name="Inhaltsplatzhalter 1"/>
-          <p:cNvSpPr>
-            <a:spLocks noGrp="1"/>
-          </p:cNvSpPr>
-          <p:nvPr>
-            <p:ph idx="1"/>
-          </p:nvPr>
-        </p:nvSpPr>
-        <p:spPr>
-          <a:xfrm>
-            <a:off x="315884" y="5445224"/>
-            <a:ext cx="8512232" cy="1192643"/>
-          </a:xfrm>
-        </p:spPr>
-        <p:txBody>
-          <a:bodyPr/>
-          <a:lstStyle/>
-          <a:p>
-            <a:pPr marL="0" indent="0">
-              <a:buNone/>
-            </a:pPr>
-            <a:r>
-              <a:rPr lang="de-DE" dirty="0" smtClean="0"/>
               <a:t>...</a:t>
             </a:r>
             <a:r>
@@ -6808,7 +8325,7 @@
           <p:nvPr/>
         </p:nvPicPr>
         <p:blipFill>
-          <a:blip r:embed="rId2"/>
+          <a:blip r:embed="rId3"/>
           <a:stretch>
             <a:fillRect/>
           </a:stretch>
@@ -6843,7 +8360,7 @@
 </p:sld>
 </file>
 
-<file path=ppt/slides/slide22.xml><?xml version="1.0" encoding="utf-8"?>
+<file path=ppt/slides/slide21.xml><?xml version="1.0" encoding="utf-8"?>
 <p:sld xmlns:a="http://schemas.openxmlformats.org/drawingml/2006/main" xmlns:r="http://schemas.openxmlformats.org/officeDocument/2006/relationships" xmlns:p="http://schemas.openxmlformats.org/presentationml/2006/main">
   <p:cSld>
     <p:spTree>
@@ -7015,7 +8532,7 @@
           <p:nvPr/>
         </p:nvPicPr>
         <p:blipFill>
-          <a:blip r:embed="rId2"/>
+          <a:blip r:embed="rId3"/>
           <a:stretch>
             <a:fillRect/>
           </a:stretch>
@@ -7050,7 +8567,7 @@
 </p:sld>
 </file>
 
-<file path=ppt/slides/slide23.xml><?xml version="1.0" encoding="utf-8"?>
+<file path=ppt/slides/slide22.xml><?xml version="1.0" encoding="utf-8"?>
 <p:sld xmlns:a="http://schemas.openxmlformats.org/drawingml/2006/main" xmlns:r="http://schemas.openxmlformats.org/officeDocument/2006/relationships" xmlns:p="http://schemas.openxmlformats.org/presentationml/2006/main">
   <p:cSld>
     <p:spTree>
@@ -7077,217 +8594,44 @@
             <p:ph idx="1"/>
           </p:nvPr>
         </p:nvSpPr>
-        <p:spPr>
-          <a:xfrm>
-            <a:off x="315884" y="5445224"/>
-            <a:ext cx="8512232" cy="1192643"/>
-          </a:xfrm>
-        </p:spPr>
-        <p:txBody>
-          <a:bodyPr>
-            <a:normAutofit fontScale="85000" lnSpcReduction="20000"/>
-          </a:bodyPr>
+        <p:spPr/>
+        <p:txBody>
+          <a:bodyPr/>
           <a:lstStyle/>
           <a:p>
             <a:pPr marL="0" indent="0">
               <a:buNone/>
             </a:pPr>
             <a:r>
-              <a:rPr lang="de-DE" dirty="0" smtClean="0"/>
-              <a:t>...“</a:t>
-            </a:r>
-            <a:r>
-              <a:rPr lang="de-DE" dirty="0" err="1" smtClean="0"/>
-              <a:t>external</a:t>
-            </a:r>
-            <a:r>
-              <a:rPr lang="de-DE" dirty="0" smtClean="0"/>
-              <a:t> </a:t>
-            </a:r>
-            <a:r>
-              <a:rPr lang="de-DE" dirty="0" err="1" smtClean="0"/>
-              <a:t>events</a:t>
-            </a:r>
-            <a:r>
-              <a:rPr lang="de-DE" dirty="0" smtClean="0"/>
-              <a:t>“ (e.g. </a:t>
-            </a:r>
-            <a:r>
-              <a:rPr lang="de-DE" dirty="0" err="1" smtClean="0"/>
-              <a:t>response</a:t>
-            </a:r>
-            <a:r>
-              <a:rPr lang="de-DE" dirty="0" smtClean="0"/>
-              <a:t> </a:t>
-            </a:r>
-            <a:r>
-              <a:rPr lang="de-DE" dirty="0" err="1" smtClean="0"/>
-              <a:t>from</a:t>
-            </a:r>
-            <a:r>
-              <a:rPr lang="de-DE" dirty="0" smtClean="0"/>
-              <a:t> </a:t>
-            </a:r>
-            <a:r>
-              <a:rPr lang="de-DE" dirty="0" err="1" smtClean="0"/>
-              <a:t>server</a:t>
-            </a:r>
-            <a:r>
-              <a:rPr lang="de-DE" dirty="0" smtClean="0"/>
-              <a:t>) </a:t>
-            </a:r>
-            <a:r>
-              <a:rPr lang="de-DE" dirty="0" err="1" smtClean="0"/>
-              <a:t>can</a:t>
-            </a:r>
-            <a:r>
-              <a:rPr lang="de-DE" dirty="0" smtClean="0"/>
-              <a:t> </a:t>
-            </a:r>
-            <a:r>
-              <a:rPr lang="de-DE" dirty="0" err="1" smtClean="0"/>
-              <a:t>trigger</a:t>
-            </a:r>
-            <a:r>
-              <a:rPr lang="de-DE" dirty="0" smtClean="0"/>
-              <a:t> </a:t>
-            </a:r>
-            <a:r>
-              <a:rPr lang="de-DE" dirty="0" err="1" smtClean="0"/>
-              <a:t>actions</a:t>
-            </a:r>
-            <a:endParaRPr lang="de-DE" dirty="0" smtClean="0"/>
-          </a:p>
-          <a:p>
-            <a:r>
-              <a:rPr lang="de-DE" dirty="0" smtClean="0"/>
-              <a:t>Flow </a:t>
-            </a:r>
-            <a:r>
-              <a:rPr lang="de-DE" dirty="0" err="1" smtClean="0"/>
-              <a:t>is</a:t>
-            </a:r>
-            <a:r>
-              <a:rPr lang="de-DE" dirty="0" smtClean="0"/>
-              <a:t> still </a:t>
-            </a:r>
-            <a:r>
-              <a:rPr lang="de-DE" dirty="0" err="1" smtClean="0"/>
-              <a:t>the</a:t>
-            </a:r>
-            <a:r>
-              <a:rPr lang="de-DE" dirty="0" smtClean="0"/>
-              <a:t> same</a:t>
-            </a:r>
-          </a:p>
-          <a:p>
-            <a:pPr marL="0" indent="0">
-              <a:buNone/>
-            </a:pPr>
-            <a:endParaRPr lang="de-DE" dirty="0"/>
-          </a:p>
-        </p:txBody>
-      </p:sp>
-      <p:sp>
-        <p:nvSpPr>
-          <p:cNvPr id="3" name="Titel 2"/>
-          <p:cNvSpPr>
-            <a:spLocks noGrp="1"/>
-          </p:cNvSpPr>
-          <p:nvPr>
-            <p:ph type="title"/>
-          </p:nvPr>
-        </p:nvSpPr>
-        <p:spPr/>
-        <p:txBody>
-          <a:bodyPr>
-            <a:normAutofit fontScale="90000"/>
-          </a:bodyPr>
-          <a:lstStyle/>
-          <a:p>
-            <a:r>
-              <a:rPr lang="de-DE" dirty="0" smtClean="0"/>
-              <a:t>UNI-DIRECTIONAL DATA FLOW - EXAMPLE 3</a:t>
-            </a:r>
-            <a:endParaRPr lang="de-DE" dirty="0"/>
-          </a:p>
-        </p:txBody>
-      </p:sp>
-      <p:pic>
-        <p:nvPicPr>
-          <p:cNvPr id="5" name="Bild 4"/>
-          <p:cNvPicPr>
-            <a:picLocks noChangeAspect="1"/>
-          </p:cNvPicPr>
-          <p:nvPr/>
-        </p:nvPicPr>
-        <p:blipFill>
-          <a:blip r:embed="rId2"/>
-          <a:stretch>
-            <a:fillRect/>
-          </a:stretch>
-        </p:blipFill>
-        <p:spPr>
-          <a:xfrm>
-            <a:off x="683568" y="879793"/>
-            <a:ext cx="7416824" cy="4298496"/>
-          </a:xfrm>
-          <a:prstGeom prst="rect">
-            <a:avLst/>
-          </a:prstGeom>
-        </p:spPr>
-      </p:pic>
-    </p:spTree>
-    <p:extLst>
-      <p:ext uri="{BB962C8B-B14F-4D97-AF65-F5344CB8AC3E}">
-        <p14:creationId xmlns:p14="http://schemas.microsoft.com/office/powerpoint/2010/main" val="1407086859"/>
-      </p:ext>
-    </p:extLst>
-  </p:cSld>
-  <p:clrMapOvr>
-    <a:masterClrMapping/>
-  </p:clrMapOvr>
-  <p:timing>
-    <p:tnLst>
-      <p:par>
-        <p:cTn xmlns:p14="http://schemas.microsoft.com/office/powerpoint/2010/main" id="1" dur="indefinite" restart="never" nodeType="tmRoot"/>
-      </p:par>
-    </p:tnLst>
-  </p:timing>
-</p:sld>
-</file>
-
-<file path=ppt/slides/slide24.xml><?xml version="1.0" encoding="utf-8"?>
-<p:sld xmlns:a="http://schemas.openxmlformats.org/drawingml/2006/main" xmlns:r="http://schemas.openxmlformats.org/officeDocument/2006/relationships" xmlns:p="http://schemas.openxmlformats.org/presentationml/2006/main">
-  <p:cSld>
-    <p:spTree>
-      <p:nvGrpSpPr>
-        <p:cNvPr id="1" name=""/>
-        <p:cNvGrpSpPr/>
-        <p:nvPr/>
-      </p:nvGrpSpPr>
-      <p:grpSpPr>
-        <a:xfrm>
-          <a:off x="0" y="0"/>
-          <a:ext cx="0" cy="0"/>
-          <a:chOff x="0" y="0"/>
-          <a:chExt cx="0" cy="0"/>
-        </a:xfrm>
-      </p:grpSpPr>
-      <p:sp>
-        <p:nvSpPr>
-          <p:cNvPr id="2" name="Inhaltsplatzhalter 1"/>
-          <p:cNvSpPr>
-            <a:spLocks noGrp="1"/>
-          </p:cNvSpPr>
-          <p:nvPr>
-            <p:ph idx="1"/>
-          </p:nvPr>
-        </p:nvSpPr>
-        <p:spPr/>
-        <p:txBody>
-          <a:bodyPr/>
-          <a:lstStyle/>
+              <a:rPr lang="de-DE" sz="2800" b="1" dirty="0" err="1" smtClean="0"/>
+              <a:t>Useful</a:t>
+            </a:r>
+            <a:r>
+              <a:rPr lang="de-DE" sz="2800" b="1" dirty="0" smtClean="0"/>
+              <a:t> </a:t>
+            </a:r>
+            <a:r>
+              <a:rPr lang="de-DE" sz="2800" b="1" dirty="0" err="1" smtClean="0"/>
+              <a:t>when</a:t>
+            </a:r>
+            <a:r>
+              <a:rPr lang="de-DE" sz="2800" b="1" dirty="0" smtClean="0"/>
+              <a:t> </a:t>
+            </a:r>
+            <a:r>
+              <a:rPr lang="de-DE" sz="2800" b="1" dirty="0" err="1" smtClean="0"/>
+              <a:t>working</a:t>
+            </a:r>
+            <a:r>
+              <a:rPr lang="de-DE" sz="2800" b="1" dirty="0" smtClean="0"/>
+              <a:t> on same </a:t>
+            </a:r>
+            <a:r>
+              <a:rPr lang="de-DE" sz="2800" b="1" dirty="0" err="1" smtClean="0"/>
+              <a:t>model</a:t>
+            </a:r>
+            <a:endParaRPr lang="de-DE" sz="2800" b="1" dirty="0" smtClean="0"/>
+          </a:p>
           <a:p>
             <a:pPr marL="0" indent="0">
               <a:buNone/>
@@ -7355,6 +8699,9 @@
             <a:endParaRPr lang="de-DE" sz="2800" dirty="0" smtClean="0"/>
           </a:p>
           <a:p>
+            <a:endParaRPr lang="de-DE" sz="2800" dirty="0" smtClean="0"/>
+          </a:p>
+          <a:p>
             <a:pPr marL="0" indent="0">
               <a:buNone/>
             </a:pPr>
@@ -7431,10 +8778,55 @@
             </a:r>
             <a:r>
               <a:rPr lang="de-DE" sz="2800" dirty="0" smtClean="0"/>
-              <a:t> a Store?</a:t>
-            </a:r>
-          </a:p>
-          <a:p>
+              <a:t> a Store</a:t>
+            </a:r>
+            <a:r>
+              <a:rPr lang="de-DE" sz="2800" dirty="0" smtClean="0"/>
+              <a:t>?</a:t>
+            </a:r>
+          </a:p>
+          <a:p>
+            <a:endParaRPr lang="de-DE" sz="2800" dirty="0" smtClean="0"/>
+          </a:p>
+          <a:p>
+            <a:pPr marL="0" indent="0">
+              <a:buNone/>
+            </a:pPr>
+            <a:r>
+              <a:rPr lang="de-DE" sz="2800" b="1" dirty="0" err="1" smtClean="0"/>
+              <a:t>Many</a:t>
+            </a:r>
+            <a:r>
+              <a:rPr lang="de-DE" sz="2800" b="1" dirty="0" smtClean="0"/>
+              <a:t> </a:t>
+            </a:r>
+            <a:r>
+              <a:rPr lang="de-DE" sz="2800" b="1" dirty="0" err="1" smtClean="0"/>
+              <a:t>implemenations</a:t>
+            </a:r>
+            <a:endParaRPr lang="de-DE" sz="2800" b="1" dirty="0" smtClean="0"/>
+          </a:p>
+          <a:p>
+            <a:r>
+              <a:rPr lang="de-DE" sz="2800" dirty="0" err="1" smtClean="0"/>
+              <a:t>No</a:t>
+            </a:r>
+            <a:r>
+              <a:rPr lang="de-DE" sz="2800" dirty="0" smtClean="0"/>
+              <a:t> „</a:t>
+            </a:r>
+            <a:r>
+              <a:rPr lang="de-DE" sz="2800" dirty="0" err="1" smtClean="0"/>
+              <a:t>standard</a:t>
+            </a:r>
+            <a:r>
+              <a:rPr lang="de-DE" sz="2800" dirty="0" smtClean="0"/>
+              <a:t>“ </a:t>
+            </a:r>
+            <a:r>
+              <a:rPr lang="de-DE" sz="2800" dirty="0" err="1" smtClean="0"/>
+              <a:t>implementation</a:t>
+            </a:r>
             <a:endParaRPr lang="de-DE" sz="2800" dirty="0" smtClean="0"/>
           </a:p>
           <a:p>
@@ -7493,7 +8885,7 @@
 </p:sld>
 </file>
 
-<file path=ppt/slides/slide25.xml><?xml version="1.0" encoding="utf-8"?>
+<file path=ppt/slides/slide23.xml><?xml version="1.0" encoding="utf-8"?>
 <p:sld xmlns:a="http://schemas.openxmlformats.org/drawingml/2006/main" xmlns:r="http://schemas.openxmlformats.org/officeDocument/2006/relationships" xmlns:p="http://schemas.openxmlformats.org/presentationml/2006/main">
   <p:cSld>
     <p:spTree>
@@ -7956,8 +9348,8 @@
           </a:p>
           <a:p>
             <a:r>
-              <a:rPr lang="de-DE" sz="2000" dirty="0" smtClean="0"/>
-              <a:t>https://github.dst.tk-inline.net/nilshartmann/flux-intro</a:t>
+              <a:rPr lang="de-DE" sz="2000" dirty="0" err="1" smtClean="0"/>
+              <a:t>tbd</a:t>
             </a:r>
             <a:endParaRPr lang="de-DE" sz="2000" dirty="0"/>
           </a:p>
@@ -9850,7 +11242,7 @@
           <p:nvPr/>
         </p:nvPicPr>
         <p:blipFill>
-          <a:blip r:embed="rId2"/>
+          <a:blip r:embed="rId3"/>
           <a:stretch>
             <a:fillRect/>
           </a:stretch>
@@ -10336,7 +11728,7 @@
           <p:nvPr/>
         </p:nvPicPr>
         <p:blipFill>
-          <a:blip r:embed="rId2"/>
+          <a:blip r:embed="rId3"/>
           <a:stretch>
             <a:fillRect/>
           </a:stretch>

</xml_diff>